<commit_message>
update syllabus 17 JavaScript et 19 composant, 2025/10/12
</commit_message>
<xml_diff>
--- a/syllabus/19_composant_vuejs/syllabus_19_composant.pptx
+++ b/syllabus/19_composant_vuejs/syllabus_19_composant.pptx
@@ -5,7 +5,7 @@
     <p:sldMasterId id="2147483843" r:id="rId1"/>
   </p:sldMasterIdLst>
   <p:notesMasterIdLst>
-    <p:notesMasterId r:id="rId49"/>
+    <p:notesMasterId r:id="rId50"/>
   </p:notesMasterIdLst>
   <p:sldIdLst>
     <p:sldId id="256" r:id="rId2"/>
@@ -54,7 +54,8 @@
     <p:sldId id="449" r:id="rId45"/>
     <p:sldId id="450" r:id="rId46"/>
     <p:sldId id="451" r:id="rId47"/>
-    <p:sldId id="429" r:id="rId48"/>
+    <p:sldId id="452" r:id="rId48"/>
+    <p:sldId id="429" r:id="rId49"/>
   </p:sldIdLst>
   <p:sldSz cx="12192000" cy="6858000"/>
   <p:notesSz cx="6858000" cy="9144000"/>
@@ -225,6 +226,7 @@
             <p14:sldId id="449"/>
             <p14:sldId id="450"/>
             <p14:sldId id="451"/>
+            <p14:sldId id="452"/>
             <p14:sldId id="429"/>
           </p14:sldIdLst>
         </p14:section>
@@ -356,7 +358,7 @@
           <a:p>
             <a:fld id="{FCE9742F-4DAE-47F5-9244-6ACC3985DD6B}" type="datetimeFigureOut">
               <a:rPr lang="fr-BE" smtClean="0"/>
-              <a:t>09-09-25</a:t>
+              <a:t>12-10-25</a:t>
             </a:fld>
             <a:endParaRPr lang="fr-BE"/>
           </a:p>
@@ -2809,7 +2811,7 @@
           <a:p>
             <a:fld id="{F3953782-D06E-4853-BE3C-64C197273937}" type="datetimeFigureOut">
               <a:rPr lang="fr-BE" smtClean="0"/>
-              <a:t>09-09-25</a:t>
+              <a:t>12-10-25</a:t>
             </a:fld>
             <a:endParaRPr lang="fr-BE"/>
           </a:p>
@@ -4338,7 +4340,7 @@
           <a:p>
             <a:fld id="{F3953782-D06E-4853-BE3C-64C197273937}" type="datetimeFigureOut">
               <a:rPr lang="fr-BE" smtClean="0"/>
-              <a:t>09-09-25</a:t>
+              <a:t>12-10-25</a:t>
             </a:fld>
             <a:endParaRPr lang="fr-BE"/>
           </a:p>
@@ -4654,7 +4656,7 @@
           <a:p>
             <a:fld id="{F3953782-D06E-4853-BE3C-64C197273937}" type="datetimeFigureOut">
               <a:rPr lang="fr-BE" smtClean="0"/>
-              <a:t>09-09-25</a:t>
+              <a:t>12-10-25</a:t>
             </a:fld>
             <a:endParaRPr lang="fr-BE"/>
           </a:p>
@@ -4851,7 +4853,7 @@
           <a:p>
             <a:fld id="{F3953782-D06E-4853-BE3C-64C197273937}" type="datetimeFigureOut">
               <a:rPr lang="fr-BE" smtClean="0"/>
-              <a:t>09-09-25</a:t>
+              <a:t>12-10-25</a:t>
             </a:fld>
             <a:endParaRPr lang="fr-BE"/>
           </a:p>
@@ -5113,7 +5115,7 @@
           <a:p>
             <a:fld id="{F3953782-D06E-4853-BE3C-64C197273937}" type="datetimeFigureOut">
               <a:rPr lang="fr-BE" smtClean="0"/>
-              <a:t>09-09-25</a:t>
+              <a:t>12-10-25</a:t>
             </a:fld>
             <a:endParaRPr lang="fr-BE"/>
           </a:p>
@@ -5491,7 +5493,7 @@
           <a:p>
             <a:fld id="{F3953782-D06E-4853-BE3C-64C197273937}" type="datetimeFigureOut">
               <a:rPr lang="fr-BE" smtClean="0"/>
-              <a:t>09-09-25</a:t>
+              <a:t>12-10-25</a:t>
             </a:fld>
             <a:endParaRPr lang="fr-BE"/>
           </a:p>
@@ -5639,7 +5641,7 @@
           <a:p>
             <a:fld id="{F3953782-D06E-4853-BE3C-64C197273937}" type="datetimeFigureOut">
               <a:rPr lang="fr-BE" smtClean="0"/>
-              <a:t>09-09-25</a:t>
+              <a:t>12-10-25</a:t>
             </a:fld>
             <a:endParaRPr lang="fr-BE"/>
           </a:p>
@@ -5988,7 +5990,7 @@
           <a:p>
             <a:fld id="{F3953782-D06E-4853-BE3C-64C197273937}" type="datetimeFigureOut">
               <a:rPr lang="fr-BE" smtClean="0"/>
-              <a:t>09-09-25</a:t>
+              <a:t>12-10-25</a:t>
             </a:fld>
             <a:endParaRPr lang="fr-BE"/>
           </a:p>
@@ -6314,7 +6316,7 @@
           <a:p>
             <a:fld id="{F3953782-D06E-4853-BE3C-64C197273937}" type="datetimeFigureOut">
               <a:rPr lang="fr-BE" smtClean="0"/>
-              <a:t>09-09-25</a:t>
+              <a:t>12-10-25</a:t>
             </a:fld>
             <a:endParaRPr lang="fr-BE"/>
           </a:p>
@@ -6927,7 +6929,7 @@
         <p14:reveal/>
       </p:transition>
     </mc:Choice>
-    <mc:Fallback xmlns:ahyp="http://schemas.microsoft.com/office/drawing/2018/hyperlinkcolor" xmlns:p15="http://schemas.microsoft.com/office/powerpoint/2012/main" xmlns:com="http://schemas.openxmlformats.org/drawingml/2006/compatibility" xmlns:pvml="urn:schemas-microsoft-com:office:powerpoint" xmlns:v="urn:schemas-microsoft-com:vml" xmlns:o="urn:schemas-microsoft-com:office:office" xmlns:dgm="http://schemas.openxmlformats.org/drawingml/2006/diagram" xmlns:c="http://schemas.openxmlformats.org/drawingml/2006/chart" xmlns:mv="urn:schemas-microsoft-com:mac:vml" xmlns="">
+    <mc:Fallback xmlns="" xmlns:mv="urn:schemas-microsoft-com:mac:vml" xmlns:c="http://schemas.openxmlformats.org/drawingml/2006/chart" xmlns:dgm="http://schemas.openxmlformats.org/drawingml/2006/diagram" xmlns:o="urn:schemas-microsoft-com:office:office" xmlns:v="urn:schemas-microsoft-com:vml" xmlns:pvml="urn:schemas-microsoft-com:office:powerpoint" xmlns:com="http://schemas.openxmlformats.org/drawingml/2006/compatibility" xmlns:p15="http://schemas.microsoft.com/office/powerpoint/2012/main" xmlns:ahyp="http://schemas.microsoft.com/office/drawing/2018/hyperlinkcolor">
       <p:transition spd="med">
         <p:fade/>
       </p:transition>
@@ -9758,7 +9760,7 @@
         <p14:reveal/>
       </p:transition>
     </mc:Choice>
-    <mc:Fallback xmlns="" xmlns:mv="urn:schemas-microsoft-com:mac:vml" xmlns:c="http://schemas.openxmlformats.org/drawingml/2006/chart" xmlns:dgm="http://schemas.openxmlformats.org/drawingml/2006/diagram" xmlns:o="urn:schemas-microsoft-com:office:office" xmlns:v="urn:schemas-microsoft-com:vml" xmlns:pvml="urn:schemas-microsoft-com:office:powerpoint" xmlns:com="http://schemas.openxmlformats.org/drawingml/2006/compatibility" xmlns:p15="http://schemas.microsoft.com/office/powerpoint/2012/main" xmlns:ahyp="http://schemas.microsoft.com/office/drawing/2018/hyperlinkcolor">
+    <mc:Fallback xmlns:ahyp="http://schemas.microsoft.com/office/drawing/2018/hyperlinkcolor" xmlns:p15="http://schemas.microsoft.com/office/powerpoint/2012/main" xmlns:com="http://schemas.openxmlformats.org/drawingml/2006/compatibility" xmlns:pvml="urn:schemas-microsoft-com:office:powerpoint" xmlns:v="urn:schemas-microsoft-com:vml" xmlns:o="urn:schemas-microsoft-com:office:office" xmlns:dgm="http://schemas.openxmlformats.org/drawingml/2006/diagram" xmlns:c="http://schemas.openxmlformats.org/drawingml/2006/chart" xmlns:mv="urn:schemas-microsoft-com:mac:vml" xmlns="">
       <p:transition spd="med">
         <p:fade/>
       </p:transition>
@@ -16381,7 +16383,16 @@
               <a:rPr lang="fr-BE" sz="1800">
                 <a:latin typeface="Consolas" panose="020B0609020204030204" pitchFamily="49" charset="0"/>
               </a:rPr>
-              <a:t>    props : {</a:t>
+              <a:t>    </a:t>
+            </a:r>
+            <a:r>
+              <a:rPr lang="fr-BE" sz="1800">
+                <a:solidFill>
+                  <a:schemeClr val="accent2"/>
+                </a:solidFill>
+                <a:latin typeface="Consolas" panose="020B0609020204030204" pitchFamily="49" charset="0"/>
+              </a:rPr>
+              <a:t>props : {</a:t>
             </a:r>
           </a:p>
           <a:p>
@@ -16477,7 +16488,7 @@
             <a:r>
               <a:rPr lang="fr-BE" sz="1800">
                 <a:solidFill>
-                  <a:schemeClr val="accent5"/>
+                  <a:schemeClr val="accent2"/>
                 </a:solidFill>
                 <a:latin typeface="Consolas" panose="020B0609020204030204" pitchFamily="49" charset="0"/>
               </a:rPr>
@@ -16497,7 +16508,7 @@
             <a:r>
               <a:rPr lang="fr-BE" sz="1800">
                 <a:solidFill>
-                  <a:schemeClr val="accent5"/>
+                  <a:schemeClr val="accent2"/>
                 </a:solidFill>
                 <a:latin typeface="Consolas" panose="020B0609020204030204" pitchFamily="49" charset="0"/>
               </a:rPr>
@@ -16517,7 +16528,7 @@
             <a:r>
               <a:rPr lang="fr-BE" sz="1800">
                 <a:solidFill>
-                  <a:schemeClr val="accent5"/>
+                  <a:schemeClr val="accent2"/>
                 </a:solidFill>
                 <a:latin typeface="Consolas" panose="020B0609020204030204" pitchFamily="49" charset="0"/>
               </a:rPr>
@@ -16537,7 +16548,7 @@
             <a:r>
               <a:rPr lang="fr-BE" sz="1800">
                 <a:solidFill>
-                  <a:schemeClr val="accent5"/>
+                  <a:schemeClr val="accent2"/>
                 </a:solidFill>
                 <a:latin typeface="Consolas" panose="020B0609020204030204" pitchFamily="49" charset="0"/>
               </a:rPr>
@@ -16557,7 +16568,7 @@
             <a:r>
               <a:rPr lang="fr-BE" sz="1800">
                 <a:solidFill>
-                  <a:schemeClr val="accent5"/>
+                  <a:schemeClr val="accent2"/>
                 </a:solidFill>
                 <a:latin typeface="Consolas" panose="020B0609020204030204" pitchFamily="49" charset="0"/>
               </a:rPr>
@@ -16576,6 +16587,9 @@
             </a:pPr>
             <a:r>
               <a:rPr lang="fr-BE" sz="1800">
+                <a:solidFill>
+                  <a:schemeClr val="accent2"/>
+                </a:solidFill>
                 <a:latin typeface="Consolas" panose="020B0609020204030204" pitchFamily="49" charset="0"/>
               </a:rPr>
               <a:t>    },</a:t>
@@ -16622,13 +16636,20 @@
         <p:spPr/>
         <p:txBody>
           <a:bodyPr>
-            <a:normAutofit fontScale="92500" lnSpcReduction="10000"/>
+            <a:normAutofit lnSpcReduction="10000"/>
           </a:bodyPr>
           <a:lstStyle/>
           <a:p>
             <a:r>
               <a:rPr lang="fr-BE"/>
-              <a:t>Un composant est défini par son </a:t>
+              <a:t>Fonctionnalités</a:t>
+            </a:r>
+          </a:p>
+          <a:p>
+            <a:pPr lvl="1"/>
+            <a:r>
+              <a:rPr lang="fr-BE"/>
+              <a:t>définir un composant par son </a:t>
             </a:r>
             <a:r>
               <a:rPr lang="fr-BE">
@@ -16652,39 +16673,39 @@
               </a:rPr>
               <a:t>template</a:t>
             </a:r>
-            <a:r>
-              <a:rPr lang="fr-BE"/>
-              <a:t> (cf exos précédents).</a:t>
-            </a:r>
-          </a:p>
-          <a:p>
-            <a:r>
-              <a:rPr lang="fr-BE"/>
-              <a:t>Un composant est défini par les </a:t>
-            </a:r>
-            <a:r>
-              <a:rPr lang="fr-BE">
-                <a:solidFill>
-                  <a:srgbClr val="996633"/>
-                </a:solidFill>
-                <a:latin typeface="Consolas" panose="020B0609020204030204" pitchFamily="49" charset="0"/>
-              </a:rPr>
-              <a:t>props :</a:t>
+          </a:p>
+          <a:p>
+            <a:pPr lvl="2"/>
+            <a:r>
+              <a:rPr lang="fr-BE"/>
+              <a:t>cf exos précédents</a:t>
             </a:r>
           </a:p>
           <a:p>
             <a:pPr lvl="1"/>
             <a:r>
               <a:rPr lang="fr-BE"/>
-              <a:t>les valeurs fournies par le composant parent.</a:t>
-            </a:r>
-          </a:p>
-          <a:p>
-            <a:pPr lvl="1"/>
-            <a:r>
-              <a:rPr lang="fr-BE">
-                <a:solidFill>
-                  <a:srgbClr val="996633"/>
+              <a:t>déclarer les variables fournies par le parent </a:t>
+            </a:r>
+          </a:p>
+          <a:p>
+            <a:pPr lvl="2"/>
+            <a:r>
+              <a:rPr lang="fr-BE">
+                <a:solidFill>
+                  <a:schemeClr val="accent2"/>
+                </a:solidFill>
+                <a:latin typeface="Consolas" panose="020B0609020204030204" pitchFamily="49" charset="0"/>
+              </a:rPr>
+              <a:t>props</a:t>
+            </a:r>
+          </a:p>
+          <a:p>
+            <a:pPr lvl="3"/>
+            <a:r>
+              <a:rPr lang="fr-BE">
+                <a:solidFill>
+                  <a:schemeClr val="accent2"/>
                 </a:solidFill>
                 <a:latin typeface="Consolas" panose="020B0609020204030204" pitchFamily="49" charset="0"/>
               </a:rPr>
@@ -16696,11 +16717,11 @@
             </a:r>
           </a:p>
           <a:p>
-            <a:pPr lvl="1"/>
-            <a:r>
-              <a:rPr lang="fr-BE">
-                <a:solidFill>
-                  <a:srgbClr val="996633"/>
+            <a:pPr lvl="3"/>
+            <a:r>
+              <a:rPr lang="fr-BE">
+                <a:solidFill>
+                  <a:schemeClr val="accent2"/>
                 </a:solidFill>
                 <a:latin typeface="Consolas" panose="020B0609020204030204" pitchFamily="49" charset="0"/>
               </a:rPr>
@@ -16712,11 +16733,11 @@
             </a:r>
           </a:p>
           <a:p>
-            <a:pPr lvl="1"/>
-            <a:r>
-              <a:rPr lang="fr-BE">
-                <a:solidFill>
-                  <a:srgbClr val="996633"/>
+            <a:pPr lvl="3"/>
+            <a:r>
+              <a:rPr lang="fr-BE">
+                <a:solidFill>
+                  <a:schemeClr val="accent2"/>
                 </a:solidFill>
                 <a:latin typeface="Consolas" panose="020B0609020204030204" pitchFamily="49" charset="0"/>
               </a:rPr>
@@ -17129,10 +17150,15 @@
             <p:ph sz="half" idx="2"/>
           </p:nvPr>
         </p:nvSpPr>
-        <p:spPr/>
+        <p:spPr>
+          <a:xfrm>
+            <a:off x="6172200" y="1690689"/>
+            <a:ext cx="5181600" cy="5033962"/>
+          </a:xfrm>
+        </p:spPr>
         <p:txBody>
           <a:bodyPr>
-            <a:normAutofit fontScale="92500"/>
+            <a:normAutofit fontScale="92500" lnSpcReduction="10000"/>
           </a:bodyPr>
           <a:lstStyle/>
           <a:p>
@@ -17145,7 +17171,14 @@
             <a:pPr lvl="1"/>
             <a:r>
               <a:rPr lang="fr-BE"/>
-              <a:t>utiliser une variable déclarée dans </a:t>
+              <a:t>utiliser une variable fournie par le parent</a:t>
+            </a:r>
+          </a:p>
+          <a:p>
+            <a:pPr lvl="2"/>
+            <a:r>
+              <a:rPr lang="fr-BE"/>
+              <a:t>déclarée dans </a:t>
             </a:r>
             <a:r>
               <a:rPr lang="fr-BE">
@@ -17168,6 +17201,41 @@
               </a:rPr>
               <a:t>{{ title }} </a:t>
             </a:r>
+          </a:p>
+          <a:p>
+            <a:pPr lvl="3"/>
+            <a:r>
+              <a:rPr lang="fr-BE"/>
+              <a:t>var </a:t>
+            </a:r>
+            <a:r>
+              <a:rPr lang="fr-BE">
+                <a:solidFill>
+                  <a:schemeClr val="accent5"/>
+                </a:solidFill>
+                <a:latin typeface="Consolas" panose="020B0609020204030204" pitchFamily="49" charset="0"/>
+              </a:rPr>
+              <a:t>title</a:t>
+            </a:r>
+            <a:r>
+              <a:rPr lang="fr-BE"/>
+              <a:t> de </a:t>
+            </a:r>
+            <a:r>
+              <a:rPr lang="fr-BE">
+                <a:solidFill>
+                  <a:srgbClr val="996633"/>
+                </a:solidFill>
+                <a:latin typeface="Consolas" panose="020B0609020204030204" pitchFamily="49" charset="0"/>
+              </a:rPr>
+              <a:t>props</a:t>
+            </a:r>
+            <a:endParaRPr lang="fr-BE">
+              <a:solidFill>
+                <a:schemeClr val="accent5"/>
+              </a:solidFill>
+              <a:latin typeface="Consolas" panose="020B0609020204030204" pitchFamily="49" charset="0"/>
+            </a:endParaRPr>
           </a:p>
           <a:p>
             <a:pPr lvl="2"/>
@@ -17707,7 +17775,12 @@
             <p:ph sz="half" idx="2"/>
           </p:nvPr>
         </p:nvSpPr>
-        <p:spPr/>
+        <p:spPr>
+          <a:xfrm>
+            <a:off x="6172200" y="1690689"/>
+            <a:ext cx="6019800" cy="4486276"/>
+          </a:xfrm>
+        </p:spPr>
         <p:txBody>
           <a:bodyPr>
             <a:noAutofit/>
@@ -17715,39 +17788,56 @@
           <a:lstStyle/>
           <a:p>
             <a:r>
-              <a:rPr lang="fr-BE" sz="2400"/>
-              <a:t>Un composant est défini par les </a:t>
-            </a:r>
-            <a:r>
-              <a:rPr lang="fr-BE" sz="2400">
+              <a:rPr lang="fr-BE"/>
+              <a:t>Fonctionnalités</a:t>
+            </a:r>
+          </a:p>
+          <a:p>
+            <a:pPr lvl="1"/>
+            <a:r>
+              <a:rPr lang="fr-BE"/>
+              <a:t>déclarer les variables définies en interne</a:t>
+            </a:r>
+          </a:p>
+          <a:p>
+            <a:pPr lvl="2"/>
+            <a:r>
+              <a:rPr lang="fr-BE">
                 <a:solidFill>
                   <a:srgbClr val="996633"/>
                 </a:solidFill>
                 <a:latin typeface="Consolas" panose="020B0609020204030204" pitchFamily="49" charset="0"/>
               </a:rPr>
-              <a:t>data()</a:t>
-            </a:r>
-          </a:p>
-          <a:p>
-            <a:pPr lvl="1"/>
-            <a:r>
-              <a:rPr lang="fr-BE" sz="2000"/>
-              <a:t>ses variables internes.</a:t>
-            </a:r>
-          </a:p>
-          <a:p>
-            <a:pPr lvl="1"/>
-            <a:r>
-              <a:rPr lang="fr-BE" sz="2000">
+              <a:t>data() {</a:t>
+            </a:r>
+            <a:br>
+              <a:rPr lang="fr-BE">
                 <a:solidFill>
                   <a:srgbClr val="996633"/>
                 </a:solidFill>
                 <a:latin typeface="Consolas" panose="020B0609020204030204" pitchFamily="49" charset="0"/>
               </a:rPr>
-              <a:t>data() {</a:t>
+            </a:br>
+            <a:r>
+              <a:rPr lang="fr-BE">
+                <a:solidFill>
+                  <a:srgbClr val="996633"/>
+                </a:solidFill>
+                <a:latin typeface="Consolas" panose="020B0609020204030204" pitchFamily="49" charset="0"/>
+              </a:rPr>
+              <a:t>  return  </a:t>
+            </a:r>
+            <a:r>
+              <a:rPr lang="fr-BE">
+                <a:solidFill>
+                  <a:schemeClr val="accent2"/>
+                </a:solidFill>
+                <a:latin typeface="Consolas" panose="020B0609020204030204" pitchFamily="49" charset="0"/>
+              </a:rPr>
+              <a:t>&lt;JSON str.&gt;</a:t>
             </a:r>
             <a:br>
-              <a:rPr lang="fr-BE" sz="2000">
+              <a:rPr lang="fr-BE">
                 <a:solidFill>
                   <a:srgbClr val="996633"/>
                 </a:solidFill>
@@ -17755,16 +17845,19 @@
               </a:rPr>
             </a:br>
             <a:r>
-              <a:rPr lang="fr-BE" sz="2000">
+              <a:rPr lang="fr-BE">
                 <a:solidFill>
                   <a:srgbClr val="996633"/>
                 </a:solidFill>
                 <a:latin typeface="Consolas" panose="020B0609020204030204" pitchFamily="49" charset="0"/>
               </a:rPr>
-              <a:t>  return  </a:t>
-            </a:r>
-            <a:r>
-              <a:rPr lang="fr-BE" sz="2000">
+              <a:t>},</a:t>
+            </a:r>
+          </a:p>
+          <a:p>
+            <a:pPr lvl="2"/>
+            <a:r>
+              <a:rPr lang="fr-BE">
                 <a:solidFill>
                   <a:schemeClr val="accent2"/>
                 </a:solidFill>
@@ -17772,40 +17865,8 @@
               </a:rPr>
               <a:t>&lt;JSON structure&gt;</a:t>
             </a:r>
-            <a:br>
-              <a:rPr lang="fr-BE" sz="2000">
-                <a:solidFill>
-                  <a:schemeClr val="accent2"/>
-                </a:solidFill>
-                <a:latin typeface="Consolas" panose="020B0609020204030204" pitchFamily="49" charset="0"/>
-              </a:rPr>
-            </a:br>
-            <a:r>
-              <a:rPr lang="fr-BE" sz="2000">
-                <a:solidFill>
-                  <a:srgbClr val="996633"/>
-                </a:solidFill>
-                <a:latin typeface="Consolas" panose="020B0609020204030204" pitchFamily="49" charset="0"/>
-              </a:rPr>
-              <a:t>},</a:t>
-            </a:r>
-          </a:p>
-          <a:p>
-            <a:r>
-              <a:rPr lang="fr-BE" sz="2400"/>
-              <a:t>La </a:t>
-            </a:r>
-            <a:r>
-              <a:rPr lang="fr-BE" sz="2400">
-                <a:solidFill>
-                  <a:schemeClr val="accent2"/>
-                </a:solidFill>
-                <a:latin typeface="Consolas" panose="020B0609020204030204" pitchFamily="49" charset="0"/>
-              </a:rPr>
-              <a:t>&lt;JSON structure&gt;</a:t>
-            </a:r>
-            <a:r>
-              <a:rPr lang="fr-BE" sz="2400"/>
+            <a:r>
+              <a:rPr lang="fr-BE"/>
               <a:t> peut contenir tous les types de variable : simple, complexe, liste, dictionnaire, integer, string, boolean, etc.</a:t>
             </a:r>
           </a:p>
@@ -18208,7 +18269,12 @@
             <p:ph sz="half" idx="2"/>
           </p:nvPr>
         </p:nvSpPr>
-        <p:spPr/>
+        <p:spPr>
+          <a:xfrm>
+            <a:off x="6172200" y="1690689"/>
+            <a:ext cx="6019800" cy="4486276"/>
+          </a:xfrm>
+        </p:spPr>
         <p:txBody>
           <a:bodyPr>
             <a:normAutofit/>
@@ -18310,7 +18376,7 @@
           <a:p>
             <a:pPr lvl="2"/>
             <a:r>
-              <a:rPr lang="fr-BE" sz="2000">
+              <a:rPr lang="fr-BE" sz="2400">
                 <a:solidFill>
                   <a:schemeClr val="accent1"/>
                 </a:solidFill>
@@ -18322,11 +18388,11 @@
           <a:p>
             <a:pPr lvl="3"/>
             <a:r>
-              <a:rPr lang="fr-BE" sz="1600"/>
+              <a:rPr lang="fr-BE"/>
               <a:t>var </a:t>
             </a:r>
             <a:r>
-              <a:rPr lang="fr-BE" sz="1600">
+              <a:rPr lang="fr-BE">
                 <a:solidFill>
                   <a:schemeClr val="accent1"/>
                 </a:solidFill>
@@ -18335,11 +18401,11 @@
               <a:t>verbose_b</a:t>
             </a:r>
             <a:r>
-              <a:rPr lang="fr-BE" sz="1600"/>
+              <a:rPr lang="fr-BE"/>
               <a:t> de </a:t>
             </a:r>
             <a:r>
-              <a:rPr lang="fr-BE" sz="1600">
+              <a:rPr lang="fr-BE">
                 <a:solidFill>
                   <a:srgbClr val="996633"/>
                 </a:solidFill>
@@ -19218,11 +19284,20 @@
             <a:r>
               <a:rPr lang="fr-BE" sz="1800">
                 <a:solidFill>
+                  <a:schemeClr val="accent5"/>
+                </a:solidFill>
+                <a:latin typeface="Consolas" panose="020B0609020204030204" pitchFamily="49" charset="0"/>
+              </a:rPr>
+              <a:t>computed</a:t>
+            </a:r>
+            <a:r>
+              <a:rPr lang="fr-BE" sz="1800">
+                <a:solidFill>
                   <a:srgbClr val="996633"/>
                 </a:solidFill>
                 <a:latin typeface="Consolas" panose="020B0609020204030204" pitchFamily="49" charset="0"/>
               </a:rPr>
-              <a:t>computed: {</a:t>
+              <a:t>: {</a:t>
             </a:r>
           </a:p>
           <a:p>
@@ -19327,11 +19402,20 @@
             <a:r>
               <a:rPr lang="fr-BE" sz="1800">
                 <a:solidFill>
+                  <a:schemeClr val="accent1"/>
+                </a:solidFill>
+                <a:latin typeface="Consolas" panose="020B0609020204030204" pitchFamily="49" charset="0"/>
+              </a:rPr>
+              <a:t>methods</a:t>
+            </a:r>
+            <a:r>
+              <a:rPr lang="fr-BE" sz="1800">
+                <a:solidFill>
                   <a:srgbClr val="996633"/>
                 </a:solidFill>
                 <a:latin typeface="Consolas" panose="020B0609020204030204" pitchFamily="49" charset="0"/>
               </a:rPr>
-              <a:t>methods: {</a:t>
+              <a:t>: {</a:t>
             </a:r>
           </a:p>
           <a:p>
@@ -19443,48 +19527,59 @@
         </p:nvSpPr>
         <p:spPr>
           <a:xfrm>
-            <a:off x="6554912" y="1690689"/>
-            <a:ext cx="4798888" cy="4486276"/>
+            <a:off x="6554912" y="1690688"/>
+            <a:ext cx="5490550" cy="5167311"/>
           </a:xfrm>
         </p:spPr>
         <p:txBody>
           <a:bodyPr>
-            <a:normAutofit fontScale="70000" lnSpcReduction="20000"/>
+            <a:normAutofit fontScale="92500" lnSpcReduction="10000"/>
           </a:bodyPr>
           <a:lstStyle/>
           <a:p>
             <a:r>
-              <a:rPr lang="fr-BE"/>
+              <a:rPr lang="fr-BE" sz="3200"/>
               <a:t>Fonctionnalités</a:t>
             </a:r>
           </a:p>
           <a:p>
             <a:pPr lvl="1"/>
             <a:r>
-              <a:rPr lang="fr-BE"/>
-              <a:t>utilisation des attributs dans le template</a:t>
-            </a:r>
+              <a:rPr lang="fr-BE" sz="2800"/>
+              <a:t>utiliser les attributs des variables dans le template</a:t>
+            </a:r>
+          </a:p>
+          <a:p>
+            <a:pPr lvl="2"/>
+            <a:r>
+              <a:rPr lang="fr-BE" sz="2600">
+                <a:solidFill>
+                  <a:schemeClr val="accent2"/>
+                </a:solidFill>
+                <a:latin typeface="Consolas" panose="020B0609020204030204" pitchFamily="49" charset="0"/>
+              </a:rPr>
+              <a:t>contents.length</a:t>
+            </a:r>
+            <a:endParaRPr lang="fr-BE" sz="2600"/>
           </a:p>
           <a:p>
             <a:pPr lvl="1"/>
             <a:r>
-              <a:rPr lang="fr-BE">
-                <a:solidFill>
-                  <a:schemeClr val="accent2"/>
-                </a:solidFill>
-                <a:latin typeface="Consolas" panose="020B0609020204030204" pitchFamily="49" charset="0"/>
-              </a:rPr>
-              <a:t>contents.length</a:t>
-            </a:r>
-            <a:endParaRPr lang="fr-BE"/>
-          </a:p>
-          <a:p>
-            <a:r>
-              <a:rPr lang="fr-BE"/>
-              <a:t>Un composant est défini par les </a:t>
-            </a:r>
-            <a:r>
-              <a:rPr lang="fr-BE">
+              <a:rPr lang="fr-BE" sz="2800"/>
+              <a:t>propriété calculée</a:t>
+            </a:r>
+          </a:p>
+          <a:p>
+            <a:pPr lvl="2"/>
+            <a:r>
+              <a:rPr lang="fr-BE" sz="2600"/>
+              <a:t>valeur actualisée en temps réel</a:t>
+            </a:r>
+          </a:p>
+          <a:p>
+            <a:pPr lvl="2"/>
+            <a:r>
+              <a:rPr lang="fr-BE" sz="2600">
                 <a:solidFill>
                   <a:schemeClr val="accent5"/>
                 </a:solidFill>
@@ -19494,32 +19589,47 @@
             </a:r>
           </a:p>
           <a:p>
+            <a:pPr lvl="3"/>
+            <a:r>
+              <a:rPr lang="fr-BE" sz="2600">
+                <a:solidFill>
+                  <a:schemeClr val="accent5"/>
+                </a:solidFill>
+                <a:latin typeface="Consolas" panose="020B0609020204030204" pitchFamily="49" charset="0"/>
+              </a:rPr>
+              <a:t>nombreArticles</a:t>
+            </a:r>
+          </a:p>
+          <a:p>
+            <a:pPr lvl="3"/>
+            <a:r>
+              <a:rPr lang="fr-BE" sz="2600">
+                <a:solidFill>
+                  <a:schemeClr val="accent5"/>
+                </a:solidFill>
+                <a:latin typeface="Consolas" panose="020B0609020204030204" pitchFamily="49" charset="0"/>
+              </a:rPr>
+              <a:t>return</a:t>
+            </a:r>
+          </a:p>
+          <a:p>
             <a:pPr lvl="1"/>
             <a:r>
-              <a:rPr lang="fr-BE"/>
-              <a:t>les propriétés calculées en temps réel (actualisées).</a:t>
-            </a:r>
-          </a:p>
-          <a:p>
-            <a:pPr lvl="1"/>
-            <a:r>
-              <a:rPr lang="fr-BE">
-                <a:solidFill>
-                  <a:schemeClr val="accent5"/>
-                </a:solidFill>
-                <a:latin typeface="Consolas" panose="020B0609020204030204" pitchFamily="49" charset="0"/>
-              </a:rPr>
-              <a:t>nombreArticles</a:t>
-            </a:r>
-            <a:endParaRPr lang="fr-BE"/>
-          </a:p>
-          <a:p>
-            <a:r>
-              <a:rPr lang="fr-BE"/>
-              <a:t>Un composant est défini par les </a:t>
-            </a:r>
-            <a:r>
-              <a:rPr lang="fr-BE">
+              <a:rPr lang="fr-BE" sz="2800"/>
+              <a:t>méthode </a:t>
+            </a:r>
+          </a:p>
+          <a:p>
+            <a:pPr lvl="2"/>
+            <a:r>
+              <a:rPr lang="fr-BE" sz="2600"/>
+              <a:t>notamment, le code appelé lors d'un évènement (click, …).</a:t>
+            </a:r>
+          </a:p>
+          <a:p>
+            <a:pPr lvl="2"/>
+            <a:r>
+              <a:rPr lang="fr-BE" sz="2600">
                 <a:solidFill>
                   <a:schemeClr val="accent1"/>
                 </a:solidFill>
@@ -19529,16 +19639,9 @@
             </a:r>
           </a:p>
           <a:p>
-            <a:pPr lvl="1"/>
-            <a:r>
-              <a:rPr lang="fr-BE"/>
-              <a:t>le code appelé lors d'un évènement (click, …).</a:t>
-            </a:r>
-          </a:p>
-          <a:p>
-            <a:pPr lvl="1"/>
-            <a:r>
-              <a:rPr lang="fr-BE">
+            <a:pPr lvl="3"/>
+            <a:r>
+              <a:rPr lang="fr-BE" sz="2600">
                 <a:solidFill>
                   <a:schemeClr val="accent1"/>
                 </a:solidFill>
@@ -19546,36 +19649,7 @@
               </a:rPr>
               <a:t>popup()</a:t>
             </a:r>
-            <a:endParaRPr lang="fr-BE"/>
-          </a:p>
-        </p:txBody>
-      </p:sp>
-      <p:sp>
-        <p:nvSpPr>
-          <p:cNvPr id="5" name="Espace réservé du numéro de diapositive 4">
-            <a:extLst>
-              <a:ext uri="{FF2B5EF4-FFF2-40B4-BE49-F238E27FC236}">
-                <a16:creationId xmlns:a16="http://schemas.microsoft.com/office/drawing/2014/main" id="{CD3123AF-CBC6-AFE3-3033-94D699285912}"/>
-              </a:ext>
-            </a:extLst>
-          </p:cNvPr>
-          <p:cNvSpPr>
-            <a:spLocks noGrp="1"/>
-          </p:cNvSpPr>
-          <p:nvPr>
-            <p:ph type="sldNum" sz="quarter" idx="12"/>
-          </p:nvPr>
-        </p:nvSpPr>
-        <p:spPr/>
-        <p:txBody>
-          <a:bodyPr/>
-          <a:lstStyle/>
-          <a:p>
-            <a:fld id="{02C092ED-0E97-497E-99D9-BB9DD7276F53}" type="slidenum">
-              <a:rPr lang="fr-BE" smtClean="0"/>
-              <a:t>46</a:t>
-            </a:fld>
-            <a:endParaRPr lang="fr-BE"/>
+            <a:endParaRPr lang="fr-BE" sz="2600"/>
           </a:p>
         </p:txBody>
       </p:sp>
@@ -19623,6 +19697,193 @@
       </p:grpSpPr>
       <p:sp>
         <p:nvSpPr>
+          <p:cNvPr id="6" name="Titre 5">
+            <a:extLst>
+              <a:ext uri="{FF2B5EF4-FFF2-40B4-BE49-F238E27FC236}">
+                <a16:creationId xmlns:a16="http://schemas.microsoft.com/office/drawing/2014/main" id="{F300668A-BDE1-16B9-E838-35278505E62E}"/>
+              </a:ext>
+            </a:extLst>
+          </p:cNvPr>
+          <p:cNvSpPr>
+            <a:spLocks noGrp="1"/>
+          </p:cNvSpPr>
+          <p:nvPr>
+            <p:ph type="title"/>
+          </p:nvPr>
+        </p:nvSpPr>
+        <p:spPr/>
+        <p:txBody>
+          <a:bodyPr/>
+          <a:lstStyle/>
+          <a:p>
+            <a:r>
+              <a:rPr lang="fr-BE"/>
+              <a:t>Exo 26 : drill </a:t>
+            </a:r>
+          </a:p>
+        </p:txBody>
+      </p:sp>
+      <p:sp>
+        <p:nvSpPr>
+          <p:cNvPr id="7" name="Espace réservé du contenu 6">
+            <a:extLst>
+              <a:ext uri="{FF2B5EF4-FFF2-40B4-BE49-F238E27FC236}">
+                <a16:creationId xmlns:a16="http://schemas.microsoft.com/office/drawing/2014/main" id="{07D18D1F-D7CF-2A23-5704-2C1029A2F934}"/>
+              </a:ext>
+            </a:extLst>
+          </p:cNvPr>
+          <p:cNvSpPr>
+            <a:spLocks noGrp="1"/>
+          </p:cNvSpPr>
+          <p:nvPr>
+            <p:ph idx="1"/>
+          </p:nvPr>
+        </p:nvSpPr>
+        <p:spPr/>
+        <p:txBody>
+          <a:bodyPr/>
+          <a:lstStyle/>
+          <a:p>
+            <a:r>
+              <a:rPr lang="fr-BE"/>
+              <a:t>Reprendre l'exo 25. </a:t>
+            </a:r>
+          </a:p>
+          <a:p>
+            <a:r>
+              <a:rPr lang="fr-BE"/>
+              <a:t>Implantez les fonctionnalités suivantes dans le footer : </a:t>
+            </a:r>
+          </a:p>
+          <a:p>
+            <a:pPr lvl="1"/>
+            <a:r>
+              <a:rPr lang="fr-BE"/>
+              <a:t>Quand on clique sur le bouton "cliquez-moi" d'un article, ses méta-données apparaissent. </a:t>
+            </a:r>
+          </a:p>
+          <a:p>
+            <a:pPr lvl="1"/>
+            <a:r>
+              <a:rPr lang="fr-BE"/>
+              <a:t>Choix de la couleur du texte : bleu ou noir</a:t>
+            </a:r>
+          </a:p>
+          <a:p>
+            <a:pPr lvl="2"/>
+            <a:r>
+              <a:rPr lang="fr-BE"/>
+              <a:t>en passant l'objet </a:t>
+            </a:r>
+            <a:r>
+              <a:rPr lang="fr-BE">
+                <a:solidFill>
+                  <a:srgbClr val="996633"/>
+                </a:solidFill>
+                <a:latin typeface="Consolas" panose="020B0609020204030204" pitchFamily="49" charset="0"/>
+              </a:rPr>
+              <a:t>event</a:t>
+            </a:r>
+            <a:r>
+              <a:rPr lang="fr-BE"/>
+              <a:t> à la fonction JS</a:t>
+            </a:r>
+          </a:p>
+          <a:p>
+            <a:pPr lvl="2"/>
+            <a:r>
+              <a:rPr lang="fr-BE"/>
+              <a:t>alternative : en utilisant </a:t>
+            </a:r>
+            <a:r>
+              <a:rPr lang="fr-BE">
+                <a:solidFill>
+                  <a:srgbClr val="996633"/>
+                </a:solidFill>
+                <a:latin typeface="Consolas" panose="020B0609020204030204" pitchFamily="49" charset="0"/>
+              </a:rPr>
+              <a:t>v-model</a:t>
+            </a:r>
+          </a:p>
+          <a:p>
+            <a:pPr lvl="1"/>
+            <a:endParaRPr lang="fr-BE"/>
+          </a:p>
+        </p:txBody>
+      </p:sp>
+      <p:sp>
+        <p:nvSpPr>
+          <p:cNvPr id="5" name="Espace réservé du numéro de diapositive 4">
+            <a:extLst>
+              <a:ext uri="{FF2B5EF4-FFF2-40B4-BE49-F238E27FC236}">
+                <a16:creationId xmlns:a16="http://schemas.microsoft.com/office/drawing/2014/main" id="{48ABD126-DF11-5A4A-B518-0358C66E5F92}"/>
+              </a:ext>
+            </a:extLst>
+          </p:cNvPr>
+          <p:cNvSpPr>
+            <a:spLocks noGrp="1"/>
+          </p:cNvSpPr>
+          <p:nvPr>
+            <p:ph type="sldNum" sz="quarter" idx="12"/>
+          </p:nvPr>
+        </p:nvSpPr>
+        <p:spPr/>
+        <p:txBody>
+          <a:bodyPr/>
+          <a:lstStyle/>
+          <a:p>
+            <a:fld id="{02C092ED-0E97-497E-99D9-BB9DD7276F53}" type="slidenum">
+              <a:rPr lang="fr-BE" smtClean="0"/>
+              <a:t>47</a:t>
+            </a:fld>
+            <a:endParaRPr lang="fr-BE"/>
+          </a:p>
+        </p:txBody>
+      </p:sp>
+    </p:spTree>
+    <p:extLst>
+      <p:ext uri="{BB962C8B-B14F-4D97-AF65-F5344CB8AC3E}">
+        <p14:creationId xmlns:p14="http://schemas.microsoft.com/office/powerpoint/2010/main" val="1161167035"/>
+      </p:ext>
+    </p:extLst>
+  </p:cSld>
+  <p:clrMapOvr>
+    <a:masterClrMapping/>
+  </p:clrMapOvr>
+  <mc:AlternateContent xmlns:mc="http://schemas.openxmlformats.org/markup-compatibility/2006" xmlns:p14="http://schemas.microsoft.com/office/powerpoint/2010/main">
+    <mc:Choice Requires="p14">
+      <p:transition spd="slow">
+        <p14:reveal/>
+      </p:transition>
+    </mc:Choice>
+    <mc:Fallback xmlns="">
+      <p:transition spd="slow">
+        <p:fade/>
+      </p:transition>
+    </mc:Fallback>
+  </mc:AlternateContent>
+</p:sld>
+</file>
+
+<file path=ppt/slides/slide48.xml><?xml version="1.0" encoding="utf-8"?>
+<p:sld xmlns:a="http://schemas.openxmlformats.org/drawingml/2006/main" xmlns:r="http://schemas.openxmlformats.org/officeDocument/2006/relationships" xmlns:p="http://schemas.openxmlformats.org/presentationml/2006/main">
+  <p:cSld>
+    <p:spTree>
+      <p:nvGrpSpPr>
+        <p:cNvPr id="1" name=""/>
+        <p:cNvGrpSpPr/>
+        <p:nvPr/>
+      </p:nvGrpSpPr>
+      <p:grpSpPr>
+        <a:xfrm>
+          <a:off x="0" y="0"/>
+          <a:ext cx="0" cy="0"/>
+          <a:chOff x="0" y="0"/>
+          <a:chExt cx="0" cy="0"/>
+        </a:xfrm>
+      </p:grpSpPr>
+      <p:sp>
+        <p:nvSpPr>
           <p:cNvPr id="2" name="Titre 1">
             <a:extLst>
               <a:ext uri="{FF2B5EF4-FFF2-40B4-BE49-F238E27FC236}">
@@ -19725,6 +19986,17 @@
             </a:r>
           </a:p>
           <a:p>
+            <a:r>
+              <a:rPr lang="fr-BE">
+                <a:solidFill>
+                  <a:srgbClr val="996633"/>
+                </a:solidFill>
+                <a:latin typeface="Consolas" panose="020B0609020204030204" pitchFamily="49" charset="0"/>
+              </a:rPr>
+              <a:t>v-model</a:t>
+            </a:r>
+          </a:p>
+          <a:p>
             <a:endParaRPr lang="fr-BE">
               <a:solidFill>
                 <a:srgbClr val="996633"/>
@@ -19765,7 +20037,7 @@
           <a:p>
             <a:fld id="{02C092ED-0E97-497E-99D9-BB9DD7276F53}" type="slidenum">
               <a:rPr lang="fr-BE" smtClean="0"/>
-              <a:t>47</a:t>
+              <a:t>48</a:t>
             </a:fld>
             <a:endParaRPr lang="fr-BE"/>
           </a:p>

</xml_diff>

<commit_message>
2026/02/21 : - update chap 27 "async request & API" - add AWebWiz framework with Fetch
</commit_message>
<xml_diff>
--- a/syllabus/19_composant_vuejs/syllabus_19_composant.pptx
+++ b/syllabus/19_composant_vuejs/syllabus_19_composant.pptx
@@ -358,7 +358,7 @@
           <a:p>
             <a:fld id="{FCE9742F-4DAE-47F5-9244-6ACC3985DD6B}" type="datetimeFigureOut">
               <a:rPr lang="fr-BE" smtClean="0"/>
-              <a:t>12-10-25</a:t>
+              <a:t>19-02-26</a:t>
             </a:fld>
             <a:endParaRPr lang="fr-BE"/>
           </a:p>
@@ -2811,7 +2811,7 @@
           <a:p>
             <a:fld id="{F3953782-D06E-4853-BE3C-64C197273937}" type="datetimeFigureOut">
               <a:rPr lang="fr-BE" smtClean="0"/>
-              <a:t>12-10-25</a:t>
+              <a:t>19-02-26</a:t>
             </a:fld>
             <a:endParaRPr lang="fr-BE"/>
           </a:p>
@@ -4340,7 +4340,7 @@
           <a:p>
             <a:fld id="{F3953782-D06E-4853-BE3C-64C197273937}" type="datetimeFigureOut">
               <a:rPr lang="fr-BE" smtClean="0"/>
-              <a:t>12-10-25</a:t>
+              <a:t>19-02-26</a:t>
             </a:fld>
             <a:endParaRPr lang="fr-BE"/>
           </a:p>
@@ -4656,7 +4656,7 @@
           <a:p>
             <a:fld id="{F3953782-D06E-4853-BE3C-64C197273937}" type="datetimeFigureOut">
               <a:rPr lang="fr-BE" smtClean="0"/>
-              <a:t>12-10-25</a:t>
+              <a:t>19-02-26</a:t>
             </a:fld>
             <a:endParaRPr lang="fr-BE"/>
           </a:p>
@@ -4853,7 +4853,7 @@
           <a:p>
             <a:fld id="{F3953782-D06E-4853-BE3C-64C197273937}" type="datetimeFigureOut">
               <a:rPr lang="fr-BE" smtClean="0"/>
-              <a:t>12-10-25</a:t>
+              <a:t>19-02-26</a:t>
             </a:fld>
             <a:endParaRPr lang="fr-BE"/>
           </a:p>
@@ -5115,7 +5115,7 @@
           <a:p>
             <a:fld id="{F3953782-D06E-4853-BE3C-64C197273937}" type="datetimeFigureOut">
               <a:rPr lang="fr-BE" smtClean="0"/>
-              <a:t>12-10-25</a:t>
+              <a:t>19-02-26</a:t>
             </a:fld>
             <a:endParaRPr lang="fr-BE"/>
           </a:p>
@@ -5493,7 +5493,7 @@
           <a:p>
             <a:fld id="{F3953782-D06E-4853-BE3C-64C197273937}" type="datetimeFigureOut">
               <a:rPr lang="fr-BE" smtClean="0"/>
-              <a:t>12-10-25</a:t>
+              <a:t>19-02-26</a:t>
             </a:fld>
             <a:endParaRPr lang="fr-BE"/>
           </a:p>
@@ -5641,7 +5641,7 @@
           <a:p>
             <a:fld id="{F3953782-D06E-4853-BE3C-64C197273937}" type="datetimeFigureOut">
               <a:rPr lang="fr-BE" smtClean="0"/>
-              <a:t>12-10-25</a:t>
+              <a:t>19-02-26</a:t>
             </a:fld>
             <a:endParaRPr lang="fr-BE"/>
           </a:p>
@@ -5990,7 +5990,7 @@
           <a:p>
             <a:fld id="{F3953782-D06E-4853-BE3C-64C197273937}" type="datetimeFigureOut">
               <a:rPr lang="fr-BE" smtClean="0"/>
-              <a:t>12-10-25</a:t>
+              <a:t>19-02-26</a:t>
             </a:fld>
             <a:endParaRPr lang="fr-BE"/>
           </a:p>
@@ -6316,7 +6316,7 @@
           <a:p>
             <a:fld id="{F3953782-D06E-4853-BE3C-64C197273937}" type="datetimeFigureOut">
               <a:rPr lang="fr-BE" smtClean="0"/>
-              <a:t>12-10-25</a:t>
+              <a:t>19-02-26</a:t>
             </a:fld>
             <a:endParaRPr lang="fr-BE"/>
           </a:p>
@@ -6929,7 +6929,7 @@
         <p14:reveal/>
       </p:transition>
     </mc:Choice>
-    <mc:Fallback xmlns="" xmlns:mv="urn:schemas-microsoft-com:mac:vml" xmlns:c="http://schemas.openxmlformats.org/drawingml/2006/chart" xmlns:dgm="http://schemas.openxmlformats.org/drawingml/2006/diagram" xmlns:o="urn:schemas-microsoft-com:office:office" xmlns:v="urn:schemas-microsoft-com:vml" xmlns:pvml="urn:schemas-microsoft-com:office:powerpoint" xmlns:com="http://schemas.openxmlformats.org/drawingml/2006/compatibility" xmlns:p15="http://schemas.microsoft.com/office/powerpoint/2012/main" xmlns:ahyp="http://schemas.microsoft.com/office/drawing/2018/hyperlinkcolor">
+    <mc:Fallback xmlns:ahyp="http://schemas.microsoft.com/office/drawing/2018/hyperlinkcolor" xmlns:p15="http://schemas.microsoft.com/office/powerpoint/2012/main" xmlns:com="http://schemas.openxmlformats.org/drawingml/2006/compatibility" xmlns:pvml="urn:schemas-microsoft-com:office:powerpoint" xmlns:v="urn:schemas-microsoft-com:vml" xmlns:o="urn:schemas-microsoft-com:office:office" xmlns:dgm="http://schemas.openxmlformats.org/drawingml/2006/diagram" xmlns:c="http://schemas.openxmlformats.org/drawingml/2006/chart" xmlns:mv="urn:schemas-microsoft-com:mac:vml" xmlns="">
       <p:transition spd="med">
         <p:fade/>
       </p:transition>
@@ -9760,7 +9760,7 @@
         <p14:reveal/>
       </p:transition>
     </mc:Choice>
-    <mc:Fallback xmlns:ahyp="http://schemas.microsoft.com/office/drawing/2018/hyperlinkcolor" xmlns:p15="http://schemas.microsoft.com/office/powerpoint/2012/main" xmlns:com="http://schemas.openxmlformats.org/drawingml/2006/compatibility" xmlns:pvml="urn:schemas-microsoft-com:office:powerpoint" xmlns:v="urn:schemas-microsoft-com:vml" xmlns:o="urn:schemas-microsoft-com:office:office" xmlns:dgm="http://schemas.openxmlformats.org/drawingml/2006/diagram" xmlns:c="http://schemas.openxmlformats.org/drawingml/2006/chart" xmlns:mv="urn:schemas-microsoft-com:mac:vml" xmlns="">
+    <mc:Fallback xmlns="" xmlns:mv="urn:schemas-microsoft-com:mac:vml" xmlns:c="http://schemas.openxmlformats.org/drawingml/2006/chart" xmlns:dgm="http://schemas.openxmlformats.org/drawingml/2006/diagram" xmlns:o="urn:schemas-microsoft-com:office:office" xmlns:v="urn:schemas-microsoft-com:vml" xmlns:pvml="urn:schemas-microsoft-com:office:powerpoint" xmlns:com="http://schemas.openxmlformats.org/drawingml/2006/compatibility" xmlns:p15="http://schemas.microsoft.com/office/powerpoint/2012/main" xmlns:ahyp="http://schemas.microsoft.com/office/drawing/2018/hyperlinkcolor">
       <p:transition spd="med">
         <p:fade/>
       </p:transition>
@@ -14449,7 +14449,7 @@
         <p:spPr/>
         <p:txBody>
           <a:bodyPr>
-            <a:normAutofit fontScale="92500" lnSpcReduction="20000"/>
+            <a:normAutofit fontScale="92500" lnSpcReduction="10000"/>
           </a:bodyPr>
           <a:lstStyle/>
           <a:p>
@@ -14543,7 +14543,7 @@
                 </a:solidFill>
                 <a:latin typeface="Consolas" panose="020B0609020204030204" pitchFamily="49" charset="0"/>
               </a:rPr>
-              <a:t>', // Nom du composant</a:t>
+              <a:t>', // Nom composant</a:t>
             </a:r>
           </a:p>
           <a:p>
@@ -15349,7 +15349,7 @@
               <a:buNone/>
             </a:pPr>
             <a:r>
-              <a:rPr lang="fr-BE" sz="1800">
+              <a:rPr lang="fr-BE" sz="2400">
                 <a:solidFill>
                   <a:srgbClr val="996633"/>
                 </a:solidFill>
@@ -15363,7 +15363,7 @@
               <a:buNone/>
             </a:pPr>
             <a:r>
-              <a:rPr lang="fr-BE" sz="1800">
+              <a:rPr lang="fr-BE" sz="2400">
                 <a:solidFill>
                   <a:srgbClr val="996633"/>
                 </a:solidFill>
@@ -15377,7 +15377,7 @@
               <a:buNone/>
             </a:pPr>
             <a:r>
-              <a:rPr lang="fr-BE" sz="1800">
+              <a:rPr lang="fr-BE" sz="2400">
                 <a:solidFill>
                   <a:srgbClr val="996633"/>
                 </a:solidFill>
@@ -15386,7 +15386,7 @@
               <a:t>    </a:t>
             </a:r>
             <a:r>
-              <a:rPr lang="fr-BE" sz="1800">
+              <a:rPr lang="fr-BE" sz="2400">
                 <a:solidFill>
                   <a:schemeClr val="accent2"/>
                 </a:solidFill>
@@ -15400,7 +15400,7 @@
               <a:buNone/>
             </a:pPr>
             <a:r>
-              <a:rPr lang="fr-BE" sz="1800">
+              <a:rPr lang="fr-BE" sz="2400">
                 <a:solidFill>
                   <a:srgbClr val="996633"/>
                 </a:solidFill>
@@ -15409,7 +15409,7 @@
               <a:t>    </a:t>
             </a:r>
             <a:r>
-              <a:rPr lang="fr-BE" sz="1800">
+              <a:rPr lang="fr-BE" sz="2400">
                 <a:solidFill>
                   <a:schemeClr val="accent5"/>
                 </a:solidFill>
@@ -15423,7 +15423,7 @@
               <a:buNone/>
             </a:pPr>
             <a:r>
-              <a:rPr lang="fr-BE" sz="1800">
+              <a:rPr lang="fr-BE" sz="2400">
                 <a:solidFill>
                   <a:srgbClr val="996633"/>
                 </a:solidFill>
@@ -15437,7 +15437,7 @@
               <a:buNone/>
             </a:pPr>
             <a:r>
-              <a:rPr lang="fr-BE" sz="1800">
+              <a:rPr lang="fr-BE" sz="2400">
                 <a:solidFill>
                   <a:srgbClr val="996633"/>
                 </a:solidFill>
@@ -15451,7 +15451,7 @@
               <a:buNone/>
             </a:pPr>
             <a:r>
-              <a:rPr lang="fr-BE" sz="1800">
+              <a:rPr lang="fr-BE" sz="2400">
                 <a:solidFill>
                   <a:srgbClr val="996633"/>
                 </a:solidFill>
@@ -15465,7 +15465,7 @@
               <a:buNone/>
             </a:pPr>
             <a:r>
-              <a:rPr lang="fr-BE" sz="1800">
+              <a:rPr lang="fr-BE" sz="2400">
                 <a:solidFill>
                   <a:srgbClr val="996633"/>
                 </a:solidFill>
@@ -15479,7 +15479,7 @@
               <a:buNone/>
             </a:pPr>
             <a:r>
-              <a:rPr lang="fr-BE" sz="1800">
+              <a:rPr lang="fr-BE" sz="2400">
                 <a:solidFill>
                   <a:srgbClr val="996633"/>
                 </a:solidFill>
@@ -15990,7 +15990,7 @@
               <a:buNone/>
             </a:pPr>
             <a:r>
-              <a:rPr lang="fr-BE" sz="1800">
+              <a:rPr lang="fr-BE" sz="2400">
                 <a:solidFill>
                   <a:srgbClr val="996633"/>
                 </a:solidFill>
@@ -16004,7 +16004,7 @@
               <a:buNone/>
             </a:pPr>
             <a:r>
-              <a:rPr lang="fr-BE" sz="1800">
+              <a:rPr lang="fr-BE" sz="2400">
                 <a:solidFill>
                   <a:srgbClr val="996633"/>
                 </a:solidFill>
@@ -16018,7 +16018,7 @@
               <a:buNone/>
             </a:pPr>
             <a:r>
-              <a:rPr lang="fr-BE" sz="1800">
+              <a:rPr lang="fr-BE" sz="2400">
                 <a:solidFill>
                   <a:srgbClr val="996633"/>
                 </a:solidFill>
@@ -16027,7 +16027,7 @@
               <a:t>  </a:t>
             </a:r>
             <a:r>
-              <a:rPr lang="fr-BE" sz="1800">
+              <a:rPr lang="fr-BE" sz="2400">
                 <a:solidFill>
                   <a:schemeClr val="accent2"/>
                 </a:solidFill>
@@ -16041,7 +16041,7 @@
               <a:buNone/>
             </a:pPr>
             <a:r>
-              <a:rPr lang="fr-BE" sz="1800">
+              <a:rPr lang="fr-BE" sz="2400">
                 <a:solidFill>
                   <a:schemeClr val="accent2"/>
                 </a:solidFill>
@@ -16055,7 +16055,7 @@
               <a:buNone/>
             </a:pPr>
             <a:r>
-              <a:rPr lang="fr-BE" sz="1800">
+              <a:rPr lang="fr-BE" sz="2400">
                 <a:solidFill>
                   <a:schemeClr val="accent2"/>
                 </a:solidFill>
@@ -16069,7 +16069,7 @@
               <a:buNone/>
             </a:pPr>
             <a:r>
-              <a:rPr lang="fr-BE" sz="1800">
+              <a:rPr lang="fr-BE" sz="2400">
                 <a:solidFill>
                   <a:schemeClr val="accent2"/>
                 </a:solidFill>
@@ -16083,7 +16083,7 @@
               <a:buNone/>
             </a:pPr>
             <a:r>
-              <a:rPr lang="fr-BE" sz="1800">
+              <a:rPr lang="fr-BE" sz="2400">
                 <a:solidFill>
                   <a:schemeClr val="accent2"/>
                 </a:solidFill>
@@ -16097,7 +16097,7 @@
               <a:buNone/>
             </a:pPr>
             <a:r>
-              <a:rPr lang="fr-BE" sz="1800">
+              <a:rPr lang="fr-BE" sz="2400">
                 <a:solidFill>
                   <a:srgbClr val="996633"/>
                 </a:solidFill>
@@ -16110,7 +16110,7 @@
             <a:pPr marL="0" indent="0">
               <a:buNone/>
             </a:pPr>
-            <a:endParaRPr lang="fr-BE" sz="1800">
+            <a:endParaRPr lang="fr-BE" sz="2400">
               <a:solidFill>
                 <a:srgbClr val="996633"/>
               </a:solidFill>
@@ -16121,7 +16121,7 @@
             <a:pPr marL="0" indent="0">
               <a:buNone/>
             </a:pPr>
-            <a:endParaRPr lang="fr-BE" sz="1800">
+            <a:endParaRPr lang="fr-BE" sz="2400">
               <a:solidFill>
                 <a:srgbClr val="996633"/>
               </a:solidFill>
@@ -16312,7 +16312,7 @@
           <a:p>
             <a:pPr marL="0" indent="0">
               <a:lnSpc>
-                <a:spcPct val="120000"/>
+                <a:spcPct val="100000"/>
               </a:lnSpc>
               <a:spcBef>
                 <a:spcPts val="0"/>
@@ -16320,7 +16320,7 @@
               <a:buNone/>
             </a:pPr>
             <a:r>
-              <a:rPr lang="fr-BE" sz="1800">
+              <a:rPr lang="fr-BE" sz="2000">
                 <a:solidFill>
                   <a:srgbClr val="996633"/>
                 </a:solidFill>
@@ -16332,7 +16332,7 @@
           <a:p>
             <a:pPr marL="0" indent="0">
               <a:lnSpc>
-                <a:spcPct val="120000"/>
+                <a:spcPct val="100000"/>
               </a:lnSpc>
               <a:spcBef>
                 <a:spcPts val="0"/>
@@ -16340,7 +16340,7 @@
               <a:buNone/>
             </a:pPr>
             <a:r>
-              <a:rPr lang="fr-BE" sz="1800">
+              <a:rPr lang="fr-BE" sz="2000">
                 <a:solidFill>
                   <a:srgbClr val="996633"/>
                 </a:solidFill>
@@ -16352,7 +16352,7 @@
           <a:p>
             <a:pPr marL="0" indent="0">
               <a:lnSpc>
-                <a:spcPct val="120000"/>
+                <a:spcPct val="100000"/>
               </a:lnSpc>
               <a:spcBef>
                 <a:spcPts val="0"/>
@@ -16360,7 +16360,7 @@
               <a:buNone/>
             </a:pPr>
             <a:r>
-              <a:rPr lang="fr-BE" sz="1800">
+              <a:rPr lang="fr-BE" sz="2000">
                 <a:solidFill>
                   <a:srgbClr val="996633"/>
                 </a:solidFill>
@@ -16372,7 +16372,7 @@
           <a:p>
             <a:pPr marL="0" indent="0">
               <a:lnSpc>
-                <a:spcPct val="120000"/>
+                <a:spcPct val="100000"/>
               </a:lnSpc>
               <a:spcBef>
                 <a:spcPts val="0"/>
@@ -16380,13 +16380,13 @@
               <a:buNone/>
             </a:pPr>
             <a:r>
-              <a:rPr lang="fr-BE" sz="1800">
+              <a:rPr lang="fr-BE" sz="2000">
                 <a:latin typeface="Consolas" panose="020B0609020204030204" pitchFamily="49" charset="0"/>
               </a:rPr>
               <a:t>    </a:t>
             </a:r>
             <a:r>
-              <a:rPr lang="fr-BE" sz="1800">
+              <a:rPr lang="fr-BE" sz="2000">
                 <a:solidFill>
                   <a:schemeClr val="accent2"/>
                 </a:solidFill>
@@ -16398,7 +16398,7 @@
           <a:p>
             <a:pPr marL="0" indent="0">
               <a:lnSpc>
-                <a:spcPct val="120000"/>
+                <a:spcPct val="100000"/>
               </a:lnSpc>
               <a:spcBef>
                 <a:spcPts val="0"/>
@@ -16406,7 +16406,7 @@
               <a:buNone/>
             </a:pPr>
             <a:r>
-              <a:rPr lang="fr-BE" sz="1800">
+              <a:rPr lang="fr-BE" sz="2000">
                 <a:solidFill>
                   <a:schemeClr val="accent2"/>
                 </a:solidFill>
@@ -16418,7 +16418,7 @@
           <a:p>
             <a:pPr marL="0" indent="0">
               <a:lnSpc>
-                <a:spcPct val="120000"/>
+                <a:spcPct val="100000"/>
               </a:lnSpc>
               <a:spcBef>
                 <a:spcPts val="0"/>
@@ -16426,7 +16426,7 @@
               <a:buNone/>
             </a:pPr>
             <a:r>
-              <a:rPr lang="fr-BE" sz="1800">
+              <a:rPr lang="fr-BE" sz="2000">
                 <a:solidFill>
                   <a:schemeClr val="accent2"/>
                 </a:solidFill>
@@ -16438,7 +16438,7 @@
           <a:p>
             <a:pPr marL="0" indent="0">
               <a:lnSpc>
-                <a:spcPct val="120000"/>
+                <a:spcPct val="100000"/>
               </a:lnSpc>
               <a:spcBef>
                 <a:spcPts val="0"/>
@@ -16446,7 +16446,7 @@
               <a:buNone/>
             </a:pPr>
             <a:r>
-              <a:rPr lang="fr-BE" sz="1800">
+              <a:rPr lang="fr-BE" sz="2000">
                 <a:solidFill>
                   <a:schemeClr val="accent2"/>
                 </a:solidFill>
@@ -16458,7 +16458,7 @@
           <a:p>
             <a:pPr marL="0" indent="0">
               <a:lnSpc>
-                <a:spcPct val="120000"/>
+                <a:spcPct val="100000"/>
               </a:lnSpc>
               <a:spcBef>
                 <a:spcPts val="0"/>
@@ -16466,7 +16466,7 @@
               <a:buNone/>
             </a:pPr>
             <a:r>
-              <a:rPr lang="fr-BE" sz="1800">
+              <a:rPr lang="fr-BE" sz="2000">
                 <a:solidFill>
                   <a:schemeClr val="accent2"/>
                 </a:solidFill>
@@ -16478,7 +16478,7 @@
           <a:p>
             <a:pPr marL="0" indent="0">
               <a:lnSpc>
-                <a:spcPct val="120000"/>
+                <a:spcPct val="100000"/>
               </a:lnSpc>
               <a:spcBef>
                 <a:spcPts val="0"/>
@@ -16486,7 +16486,7 @@
               <a:buNone/>
             </a:pPr>
             <a:r>
-              <a:rPr lang="fr-BE" sz="1800">
+              <a:rPr lang="fr-BE" sz="2000">
                 <a:solidFill>
                   <a:schemeClr val="accent2"/>
                 </a:solidFill>
@@ -16498,7 +16498,7 @@
           <a:p>
             <a:pPr marL="0" indent="0">
               <a:lnSpc>
-                <a:spcPct val="120000"/>
+                <a:spcPct val="100000"/>
               </a:lnSpc>
               <a:spcBef>
                 <a:spcPts val="0"/>
@@ -16506,7 +16506,7 @@
               <a:buNone/>
             </a:pPr>
             <a:r>
-              <a:rPr lang="fr-BE" sz="1800">
+              <a:rPr lang="fr-BE" sz="2000">
                 <a:solidFill>
                   <a:schemeClr val="accent2"/>
                 </a:solidFill>
@@ -16518,7 +16518,7 @@
           <a:p>
             <a:pPr marL="0" indent="0">
               <a:lnSpc>
-                <a:spcPct val="120000"/>
+                <a:spcPct val="100000"/>
               </a:lnSpc>
               <a:spcBef>
                 <a:spcPts val="0"/>
@@ -16526,7 +16526,7 @@
               <a:buNone/>
             </a:pPr>
             <a:r>
-              <a:rPr lang="fr-BE" sz="1800">
+              <a:rPr lang="fr-BE" sz="2000">
                 <a:solidFill>
                   <a:schemeClr val="accent2"/>
                 </a:solidFill>
@@ -16538,7 +16538,7 @@
           <a:p>
             <a:pPr marL="0" indent="0">
               <a:lnSpc>
-                <a:spcPct val="120000"/>
+                <a:spcPct val="100000"/>
               </a:lnSpc>
               <a:spcBef>
                 <a:spcPts val="0"/>
@@ -16546,7 +16546,7 @@
               <a:buNone/>
             </a:pPr>
             <a:r>
-              <a:rPr lang="fr-BE" sz="1800">
+              <a:rPr lang="fr-BE" sz="2000">
                 <a:solidFill>
                   <a:schemeClr val="accent2"/>
                 </a:solidFill>
@@ -16558,7 +16558,7 @@
           <a:p>
             <a:pPr marL="0" indent="0">
               <a:lnSpc>
-                <a:spcPct val="120000"/>
+                <a:spcPct val="100000"/>
               </a:lnSpc>
               <a:spcBef>
                 <a:spcPts val="0"/>
@@ -16566,7 +16566,7 @@
               <a:buNone/>
             </a:pPr>
             <a:r>
-              <a:rPr lang="fr-BE" sz="1800">
+              <a:rPr lang="fr-BE" sz="2000">
                 <a:solidFill>
                   <a:schemeClr val="accent2"/>
                 </a:solidFill>
@@ -16578,7 +16578,7 @@
           <a:p>
             <a:pPr marL="0" indent="0">
               <a:lnSpc>
-                <a:spcPct val="120000"/>
+                <a:spcPct val="100000"/>
               </a:lnSpc>
               <a:spcBef>
                 <a:spcPts val="0"/>
@@ -16586,7 +16586,7 @@
               <a:buNone/>
             </a:pPr>
             <a:r>
-              <a:rPr lang="fr-BE" sz="1800">
+              <a:rPr lang="fr-BE" sz="2000">
                 <a:solidFill>
                   <a:schemeClr val="accent2"/>
                 </a:solidFill>
@@ -16598,7 +16598,7 @@
           <a:p>
             <a:pPr marL="0" indent="0">
               <a:lnSpc>
-                <a:spcPct val="120000"/>
+                <a:spcPct val="100000"/>
               </a:lnSpc>
               <a:spcBef>
                 <a:spcPts val="0"/>
@@ -16606,7 +16606,7 @@
               <a:buNone/>
             </a:pPr>
             <a:r>
-              <a:rPr lang="fr-BE" sz="1800">
+              <a:rPr lang="fr-BE" sz="2000">
                 <a:solidFill>
                   <a:srgbClr val="996633"/>
                 </a:solidFill>
@@ -16876,10 +16876,13 @@
           <a:lstStyle/>
           <a:p>
             <a:pPr marL="0" indent="0">
+              <a:lnSpc>
+                <a:spcPct val="100000"/>
+              </a:lnSpc>
               <a:buNone/>
             </a:pPr>
             <a:r>
-              <a:rPr lang="fr-BE" sz="1800">
+              <a:rPr lang="fr-BE" sz="2000">
                 <a:solidFill>
                   <a:srgbClr val="996633"/>
                 </a:solidFill>
@@ -16890,10 +16893,13 @@
           </a:p>
           <a:p>
             <a:pPr marL="0" indent="0">
+              <a:lnSpc>
+                <a:spcPct val="100000"/>
+              </a:lnSpc>
               <a:buNone/>
             </a:pPr>
             <a:r>
-              <a:rPr lang="fr-BE" sz="1800">
+              <a:rPr lang="fr-BE" sz="2000">
                 <a:solidFill>
                   <a:srgbClr val="996633"/>
                 </a:solidFill>
@@ -16904,10 +16910,13 @@
           </a:p>
           <a:p>
             <a:pPr marL="0" indent="0">
+              <a:lnSpc>
+                <a:spcPct val="100000"/>
+              </a:lnSpc>
               <a:buNone/>
             </a:pPr>
             <a:r>
-              <a:rPr lang="fr-BE" sz="1800">
+              <a:rPr lang="fr-BE" sz="2000">
                 <a:solidFill>
                   <a:srgbClr val="996633"/>
                 </a:solidFill>
@@ -16916,7 +16925,7 @@
               <a:t>    &lt;h1 </a:t>
             </a:r>
             <a:r>
-              <a:rPr lang="fr-BE" sz="1800">
+              <a:rPr lang="fr-BE" sz="2000">
                 <a:solidFill>
                   <a:schemeClr val="accent2"/>
                 </a:solidFill>
@@ -16925,7 +16934,7 @@
               <a:t>v-bind:class="theme"</a:t>
             </a:r>
             <a:r>
-              <a:rPr lang="fr-BE" sz="1800">
+              <a:rPr lang="fr-BE" sz="2000">
                 <a:solidFill>
                   <a:srgbClr val="996633"/>
                 </a:solidFill>
@@ -16936,10 +16945,13 @@
           </a:p>
           <a:p>
             <a:pPr marL="0" indent="0">
+              <a:lnSpc>
+                <a:spcPct val="100000"/>
+              </a:lnSpc>
               <a:buNone/>
             </a:pPr>
             <a:r>
-              <a:rPr lang="fr-BE" sz="1800">
+              <a:rPr lang="fr-BE" sz="2000">
                 <a:solidFill>
                   <a:srgbClr val="996633"/>
                 </a:solidFill>
@@ -16948,7 +16960,7 @@
               <a:t>      </a:t>
             </a:r>
             <a:r>
-              <a:rPr lang="fr-BE" sz="1800">
+              <a:rPr lang="fr-BE" sz="2000">
                 <a:solidFill>
                   <a:schemeClr val="accent5"/>
                 </a:solidFill>
@@ -16959,10 +16971,13 @@
           </a:p>
           <a:p>
             <a:pPr marL="0" indent="0">
+              <a:lnSpc>
+                <a:spcPct val="100000"/>
+              </a:lnSpc>
               <a:buNone/>
             </a:pPr>
             <a:r>
-              <a:rPr lang="fr-BE" sz="1800">
+              <a:rPr lang="fr-BE" sz="2000">
                 <a:solidFill>
                   <a:srgbClr val="996633"/>
                 </a:solidFill>
@@ -16973,10 +16988,13 @@
           </a:p>
           <a:p>
             <a:pPr marL="0" indent="0">
+              <a:lnSpc>
+                <a:spcPct val="100000"/>
+              </a:lnSpc>
               <a:buNone/>
             </a:pPr>
             <a:r>
-              <a:rPr lang="fr-BE" sz="1800">
+              <a:rPr lang="fr-BE" sz="2000">
                 <a:solidFill>
                   <a:srgbClr val="996633"/>
                 </a:solidFill>
@@ -16985,7 +17003,7 @@
               <a:t>    &lt;h2 </a:t>
             </a:r>
             <a:r>
-              <a:rPr lang="fr-BE" sz="1800">
+              <a:rPr lang="fr-BE" sz="2000">
                 <a:solidFill>
                   <a:schemeClr val="accent1"/>
                 </a:solidFill>
@@ -16994,7 +17012,7 @@
               <a:t>v-if="this.verbose_b"</a:t>
             </a:r>
             <a:r>
-              <a:rPr lang="fr-BE" sz="1800">
+              <a:rPr lang="fr-BE" sz="2000">
                 <a:solidFill>
                   <a:srgbClr val="996633"/>
                 </a:solidFill>
@@ -17005,10 +17023,13 @@
           </a:p>
           <a:p>
             <a:pPr marL="0" indent="0">
+              <a:lnSpc>
+                <a:spcPct val="100000"/>
+              </a:lnSpc>
               <a:buNone/>
             </a:pPr>
             <a:r>
-              <a:rPr lang="fr-BE" sz="1800">
+              <a:rPr lang="fr-BE" sz="2000">
                 <a:solidFill>
                   <a:srgbClr val="996633"/>
                 </a:solidFill>
@@ -17017,7 +17038,7 @@
               <a:t>       </a:t>
             </a:r>
             <a:r>
-              <a:rPr lang="fr-BE" sz="1800">
+              <a:rPr lang="fr-BE" sz="2000">
                 <a:solidFill>
                   <a:schemeClr val="accent5"/>
                 </a:solidFill>
@@ -17028,10 +17049,13 @@
           </a:p>
           <a:p>
             <a:pPr marL="0" indent="0">
+              <a:lnSpc>
+                <a:spcPct val="100000"/>
+              </a:lnSpc>
               <a:buNone/>
             </a:pPr>
             <a:r>
-              <a:rPr lang="fr-BE" sz="1800">
+              <a:rPr lang="fr-BE" sz="2000">
                 <a:solidFill>
                   <a:srgbClr val="996633"/>
                 </a:solidFill>
@@ -17042,10 +17066,13 @@
           </a:p>
           <a:p>
             <a:pPr marL="0" indent="0">
+              <a:lnSpc>
+                <a:spcPct val="100000"/>
+              </a:lnSpc>
               <a:buNone/>
             </a:pPr>
             <a:r>
-              <a:rPr lang="fr-BE" sz="1800">
+              <a:rPr lang="fr-BE" sz="2000">
                 <a:solidFill>
                   <a:srgbClr val="996633"/>
                 </a:solidFill>
@@ -17054,7 +17081,7 @@
               <a:t>    &lt;h2 </a:t>
             </a:r>
             <a:r>
-              <a:rPr lang="fr-BE" sz="1800">
+              <a:rPr lang="fr-BE" sz="2000">
                 <a:solidFill>
                   <a:schemeClr val="accent1"/>
                 </a:solidFill>
@@ -17063,7 +17090,7 @@
               <a:t>v-else</a:t>
             </a:r>
             <a:r>
-              <a:rPr lang="fr-BE" sz="1800">
+              <a:rPr lang="fr-BE" sz="2000">
                 <a:solidFill>
                   <a:srgbClr val="996633"/>
                 </a:solidFill>
@@ -17072,7 +17099,7 @@
               <a:t>&gt;</a:t>
             </a:r>
             <a:r>
-              <a:rPr lang="fr-BE" sz="1800">
+              <a:rPr lang="fr-BE" sz="2000">
                 <a:solidFill>
                   <a:schemeClr val="accent5"/>
                 </a:solidFill>
@@ -17081,7 +17108,7 @@
               <a:t>{{ title }}</a:t>
             </a:r>
             <a:r>
-              <a:rPr lang="fr-BE" sz="1800">
+              <a:rPr lang="fr-BE" sz="2000">
                 <a:solidFill>
                   <a:srgbClr val="996633"/>
                 </a:solidFill>
@@ -17092,10 +17119,13 @@
           </a:p>
           <a:p>
             <a:pPr marL="0" indent="0">
+              <a:lnSpc>
+                <a:spcPct val="100000"/>
+              </a:lnSpc>
               <a:buNone/>
             </a:pPr>
             <a:r>
-              <a:rPr lang="fr-BE" sz="1800">
+              <a:rPr lang="fr-BE" sz="2000">
                 <a:solidFill>
                   <a:srgbClr val="996633"/>
                 </a:solidFill>
@@ -17106,10 +17136,13 @@
           </a:p>
           <a:p>
             <a:pPr marL="0" indent="0">
+              <a:lnSpc>
+                <a:spcPct val="100000"/>
+              </a:lnSpc>
               <a:buNone/>
             </a:pPr>
             <a:r>
-              <a:rPr lang="fr-BE" sz="1800">
+              <a:rPr lang="fr-BE" sz="2000">
                 <a:solidFill>
                   <a:srgbClr val="996633"/>
                 </a:solidFill>
@@ -17120,10 +17153,13 @@
           </a:p>
           <a:p>
             <a:pPr marL="0" indent="0">
+              <a:lnSpc>
+                <a:spcPct val="100000"/>
+              </a:lnSpc>
               <a:buNone/>
             </a:pPr>
             <a:r>
-              <a:rPr lang="fr-BE" sz="1800">
+              <a:rPr lang="fr-BE" sz="2000">
                 <a:solidFill>
                   <a:srgbClr val="996633"/>
                 </a:solidFill>
@@ -17479,7 +17515,7 @@
               <a:buNone/>
             </a:pPr>
             <a:r>
-              <a:rPr lang="fr-BE" sz="1800">
+              <a:rPr lang="fr-BE" sz="2000">
                 <a:solidFill>
                   <a:srgbClr val="996633"/>
                 </a:solidFill>
@@ -17499,7 +17535,7 @@
               <a:buNone/>
             </a:pPr>
             <a:r>
-              <a:rPr lang="fr-BE" sz="1800">
+              <a:rPr lang="fr-BE" sz="2000">
                 <a:solidFill>
                   <a:srgbClr val="996633"/>
                 </a:solidFill>
@@ -17508,7 +17544,7 @@
               <a:t>  return  </a:t>
             </a:r>
             <a:r>
-              <a:rPr lang="fr-BE" sz="1800">
+              <a:rPr lang="fr-BE" sz="2000">
                 <a:solidFill>
                   <a:schemeClr val="accent2"/>
                 </a:solidFill>
@@ -17528,7 +17564,7 @@
               <a:buNone/>
             </a:pPr>
             <a:r>
-              <a:rPr lang="fr-BE" sz="1800">
+              <a:rPr lang="fr-BE" sz="2000">
                 <a:solidFill>
                   <a:schemeClr val="accent2"/>
                 </a:solidFill>
@@ -17548,7 +17584,7 @@
               <a:buNone/>
             </a:pPr>
             <a:r>
-              <a:rPr lang="fr-BE" sz="1800">
+              <a:rPr lang="fr-BE" sz="2000">
                 <a:solidFill>
                   <a:schemeClr val="accent2"/>
                 </a:solidFill>
@@ -17568,7 +17604,7 @@
               <a:buNone/>
             </a:pPr>
             <a:r>
-              <a:rPr lang="fr-BE" sz="1800">
+              <a:rPr lang="fr-BE" sz="2000">
                 <a:solidFill>
                   <a:schemeClr val="accent2"/>
                 </a:solidFill>
@@ -17588,7 +17624,7 @@
               <a:buNone/>
             </a:pPr>
             <a:r>
-              <a:rPr lang="fr-BE" sz="1800">
+              <a:rPr lang="fr-BE" sz="2000">
                 <a:solidFill>
                   <a:schemeClr val="accent2"/>
                 </a:solidFill>
@@ -17608,7 +17644,7 @@
               <a:buNone/>
             </a:pPr>
             <a:r>
-              <a:rPr lang="fr-BE" sz="1800">
+              <a:rPr lang="fr-BE" sz="2000">
                 <a:solidFill>
                   <a:schemeClr val="accent2"/>
                 </a:solidFill>
@@ -17628,7 +17664,7 @@
               <a:buNone/>
             </a:pPr>
             <a:r>
-              <a:rPr lang="fr-BE" sz="1800">
+              <a:rPr lang="fr-BE" sz="2000">
                 <a:solidFill>
                   <a:schemeClr val="accent2"/>
                 </a:solidFill>
@@ -17648,7 +17684,7 @@
               <a:buNone/>
             </a:pPr>
             <a:r>
-              <a:rPr lang="fr-BE" sz="1800">
+              <a:rPr lang="fr-BE" sz="2000">
                 <a:solidFill>
                   <a:schemeClr val="accent2"/>
                 </a:solidFill>
@@ -17668,7 +17704,7 @@
               <a:buNone/>
             </a:pPr>
             <a:r>
-              <a:rPr lang="fr-BE" sz="1800">
+              <a:rPr lang="fr-BE" sz="2000">
                 <a:solidFill>
                   <a:schemeClr val="accent2"/>
                 </a:solidFill>
@@ -17688,7 +17724,7 @@
               <a:buNone/>
             </a:pPr>
             <a:r>
-              <a:rPr lang="fr-BE" sz="1800">
+              <a:rPr lang="fr-BE" sz="2000">
                 <a:solidFill>
                   <a:schemeClr val="accent2"/>
                 </a:solidFill>
@@ -17708,7 +17744,7 @@
               <a:buNone/>
             </a:pPr>
             <a:r>
-              <a:rPr lang="fr-BE" sz="1800">
+              <a:rPr lang="fr-BE" sz="2000">
                 <a:solidFill>
                   <a:schemeClr val="accent2"/>
                 </a:solidFill>
@@ -17728,7 +17764,7 @@
               <a:buNone/>
             </a:pPr>
             <a:r>
-              <a:rPr lang="fr-BE" sz="1800">
+              <a:rPr lang="fr-BE" sz="2000">
                 <a:solidFill>
                   <a:schemeClr val="accent2"/>
                 </a:solidFill>
@@ -17748,7 +17784,7 @@
               <a:buNone/>
             </a:pPr>
             <a:r>
-              <a:rPr lang="fr-BE" sz="1800">
+              <a:rPr lang="fr-BE" sz="2000">
                 <a:solidFill>
                   <a:srgbClr val="996633"/>
                 </a:solidFill>
@@ -17995,10 +18031,16 @@
           <a:lstStyle/>
           <a:p>
             <a:pPr marL="0" indent="0">
+              <a:lnSpc>
+                <a:spcPct val="100000"/>
+              </a:lnSpc>
+              <a:spcBef>
+                <a:spcPts val="0"/>
+              </a:spcBef>
               <a:buNone/>
             </a:pPr>
             <a:r>
-              <a:rPr lang="fr-BE" sz="1800">
+              <a:rPr lang="fr-BE" sz="2000">
                 <a:solidFill>
                   <a:srgbClr val="996633"/>
                 </a:solidFill>
@@ -18009,10 +18051,16 @@
           </a:p>
           <a:p>
             <a:pPr marL="0" indent="0">
+              <a:lnSpc>
+                <a:spcPct val="100000"/>
+              </a:lnSpc>
+              <a:spcBef>
+                <a:spcPts val="0"/>
+              </a:spcBef>
               <a:buNone/>
             </a:pPr>
             <a:r>
-              <a:rPr lang="fr-BE" sz="1800">
+              <a:rPr lang="fr-BE" sz="2000">
                 <a:solidFill>
                   <a:srgbClr val="996633"/>
                 </a:solidFill>
@@ -18023,10 +18071,16 @@
           </a:p>
           <a:p>
             <a:pPr marL="0" indent="0">
+              <a:lnSpc>
+                <a:spcPct val="100000"/>
+              </a:lnSpc>
+              <a:spcBef>
+                <a:spcPts val="0"/>
+              </a:spcBef>
               <a:buNone/>
             </a:pPr>
             <a:r>
-              <a:rPr lang="fr-BE" sz="1800">
+              <a:rPr lang="fr-BE" sz="2000">
                 <a:solidFill>
                   <a:srgbClr val="996633"/>
                 </a:solidFill>
@@ -18037,10 +18091,16 @@
           </a:p>
           <a:p>
             <a:pPr marL="0" indent="0">
+              <a:lnSpc>
+                <a:spcPct val="100000"/>
+              </a:lnSpc>
+              <a:spcBef>
+                <a:spcPts val="0"/>
+              </a:spcBef>
               <a:buNone/>
             </a:pPr>
             <a:r>
-              <a:rPr lang="fr-BE" sz="1800">
+              <a:rPr lang="fr-BE" sz="2000">
                 <a:solidFill>
                   <a:srgbClr val="996633"/>
                 </a:solidFill>
@@ -18049,7 +18109,7 @@
               <a:t>  &lt;section </a:t>
             </a:r>
             <a:r>
-              <a:rPr lang="fr-BE" sz="1800">
+              <a:rPr lang="fr-BE" sz="2000">
                 <a:solidFill>
                   <a:schemeClr val="accent2"/>
                 </a:solidFill>
@@ -18058,7 +18118,7 @@
               <a:t>v-for="c in contents"</a:t>
             </a:r>
             <a:r>
-              <a:rPr lang="fr-BE" sz="1800">
+              <a:rPr lang="fr-BE" sz="2000">
                 <a:solidFill>
                   <a:srgbClr val="996633"/>
                 </a:solidFill>
@@ -18069,10 +18129,16 @@
           </a:p>
           <a:p>
             <a:pPr marL="0" indent="0">
+              <a:lnSpc>
+                <a:spcPct val="100000"/>
+              </a:lnSpc>
+              <a:spcBef>
+                <a:spcPts val="0"/>
+              </a:spcBef>
               <a:buNone/>
             </a:pPr>
             <a:r>
-              <a:rPr lang="fr-BE" sz="1800">
+              <a:rPr lang="fr-BE" sz="2000">
                 <a:solidFill>
                   <a:srgbClr val="996633"/>
                 </a:solidFill>
@@ -18081,168 +18147,172 @@
               <a:t>    &lt;h3&gt;{{ </a:t>
             </a:r>
             <a:r>
-              <a:rPr lang="fr-BE" sz="1800">
+              <a:rPr lang="fr-BE" sz="2000">
                 <a:solidFill>
                   <a:schemeClr val="accent2"/>
                 </a:solidFill>
                 <a:latin typeface="Consolas" panose="020B0609020204030204" pitchFamily="49" charset="0"/>
               </a:rPr>
-              <a:t>c</a:t>
-            </a:r>
-            <a:r>
-              <a:rPr lang="fr-BE" sz="1800">
+              <a:t>c.title</a:t>
+            </a:r>
+            <a:r>
+              <a:rPr lang="fr-BE" sz="2000">
                 <a:solidFill>
                   <a:srgbClr val="996633"/>
                 </a:solidFill>
                 <a:latin typeface="Consolas" panose="020B0609020204030204" pitchFamily="49" charset="0"/>
               </a:rPr>
-              <a:t>.title }}&lt;/h3&gt;</a:t>
+              <a:t> }}&lt;/h3&gt;</a:t>
             </a:r>
           </a:p>
           <a:p>
             <a:pPr marL="0" indent="0">
+              <a:lnSpc>
+                <a:spcPct val="100000"/>
+              </a:lnSpc>
+              <a:spcBef>
+                <a:spcPts val="0"/>
+              </a:spcBef>
               <a:buNone/>
             </a:pPr>
             <a:r>
-              <a:rPr lang="fr-BE" sz="1800">
+              <a:rPr lang="fr-BE" sz="2000">
                 <a:solidFill>
                   <a:srgbClr val="996633"/>
                 </a:solidFill>
                 <a:latin typeface="Consolas" panose="020B0609020204030204" pitchFamily="49" charset="0"/>
               </a:rPr>
-              <a:t>    &lt;p&gt;{{ </a:t>
-            </a:r>
-            <a:r>
-              <a:rPr lang="fr-BE" sz="1800">
+              <a:t>    &lt;p </a:t>
+            </a:r>
+            <a:r>
+              <a:rPr lang="fr-BE" sz="2000">
+                <a:solidFill>
+                  <a:schemeClr val="accent1"/>
+                </a:solidFill>
+                <a:latin typeface="Consolas" panose="020B0609020204030204" pitchFamily="49" charset="0"/>
+              </a:rPr>
+              <a:t>v-show="this.verbose_b"</a:t>
+            </a:r>
+            <a:r>
+              <a:rPr lang="fr-BE" sz="2000">
+                <a:solidFill>
+                  <a:srgbClr val="996633"/>
+                </a:solidFill>
+                <a:latin typeface="Consolas" panose="020B0609020204030204" pitchFamily="49" charset="0"/>
+              </a:rPr>
+              <a:t> &gt;</a:t>
+            </a:r>
+          </a:p>
+          <a:p>
+            <a:pPr marL="0" indent="0">
+              <a:lnSpc>
+                <a:spcPct val="100000"/>
+              </a:lnSpc>
+              <a:spcBef>
+                <a:spcPts val="0"/>
+              </a:spcBef>
+              <a:buNone/>
+            </a:pPr>
+            <a:r>
+              <a:rPr lang="fr-BE" sz="2000">
+                <a:solidFill>
+                  <a:srgbClr val="996633"/>
+                </a:solidFill>
+                <a:latin typeface="Consolas" panose="020B0609020204030204" pitchFamily="49" charset="0"/>
+              </a:rPr>
+              <a:t>      {{ </a:t>
+            </a:r>
+            <a:r>
+              <a:rPr lang="fr-BE" sz="2000">
                 <a:solidFill>
                   <a:schemeClr val="accent2"/>
                 </a:solidFill>
                 <a:latin typeface="Consolas" panose="020B0609020204030204" pitchFamily="49" charset="0"/>
               </a:rPr>
-              <a:t>c</a:t>
-            </a:r>
-            <a:r>
-              <a:rPr lang="fr-BE" sz="1800">
+              <a:t>c.more </a:t>
+            </a:r>
+            <a:r>
+              <a:rPr lang="fr-BE" sz="2000">
                 <a:solidFill>
                   <a:srgbClr val="996633"/>
                 </a:solidFill>
                 <a:latin typeface="Consolas" panose="020B0609020204030204" pitchFamily="49" charset="0"/>
               </a:rPr>
-              <a:t>.body }}&lt;/p&gt;</a:t>
+              <a:t>}}   </a:t>
             </a:r>
           </a:p>
           <a:p>
             <a:pPr marL="0" indent="0">
+              <a:lnSpc>
+                <a:spcPct val="100000"/>
+              </a:lnSpc>
+              <a:spcBef>
+                <a:spcPts val="0"/>
+              </a:spcBef>
               <a:buNone/>
             </a:pPr>
             <a:r>
-              <a:rPr lang="fr-BE" sz="1800">
+              <a:rPr lang="fr-BE" sz="2000">
                 <a:solidFill>
                   <a:srgbClr val="996633"/>
                 </a:solidFill>
                 <a:latin typeface="Consolas" panose="020B0609020204030204" pitchFamily="49" charset="0"/>
               </a:rPr>
-              <a:t>    &lt;p </a:t>
-            </a:r>
-            <a:r>
-              <a:rPr lang="fr-BE" sz="1800">
-                <a:solidFill>
-                  <a:schemeClr val="accent1"/>
-                </a:solidFill>
-                <a:latin typeface="Consolas" panose="020B0609020204030204" pitchFamily="49" charset="0"/>
-              </a:rPr>
-              <a:t>v-show="this.verbose_b"</a:t>
-            </a:r>
-            <a:r>
-              <a:rPr lang="fr-BE" sz="1800">
+              <a:t>    &lt;/p&gt;</a:t>
+            </a:r>
+          </a:p>
+          <a:p>
+            <a:pPr marL="0" indent="0">
+              <a:lnSpc>
+                <a:spcPct val="100000"/>
+              </a:lnSpc>
+              <a:spcBef>
+                <a:spcPts val="0"/>
+              </a:spcBef>
+              <a:buNone/>
+            </a:pPr>
+            <a:r>
+              <a:rPr lang="fr-BE" sz="2000">
                 <a:solidFill>
                   <a:srgbClr val="996633"/>
                 </a:solidFill>
                 <a:latin typeface="Consolas" panose="020B0609020204030204" pitchFamily="49" charset="0"/>
               </a:rPr>
-              <a:t> &gt;&lt;em&gt;</a:t>
+              <a:t>  &lt;/section&gt;</a:t>
             </a:r>
           </a:p>
           <a:p>
             <a:pPr marL="0" indent="0">
+              <a:lnSpc>
+                <a:spcPct val="100000"/>
+              </a:lnSpc>
+              <a:spcBef>
+                <a:spcPts val="0"/>
+              </a:spcBef>
               <a:buNone/>
             </a:pPr>
             <a:r>
-              <a:rPr lang="fr-BE" sz="1800">
+              <a:rPr lang="fr-BE" sz="2000">
                 <a:solidFill>
                   <a:srgbClr val="996633"/>
                 </a:solidFill>
                 <a:latin typeface="Consolas" panose="020B0609020204030204" pitchFamily="49" charset="0"/>
               </a:rPr>
-              <a:t>      {{ </a:t>
-            </a:r>
-            <a:r>
-              <a:rPr lang="fr-BE" sz="1800">
-                <a:solidFill>
-                  <a:schemeClr val="accent2"/>
-                </a:solidFill>
-                <a:latin typeface="Consolas" panose="020B0609020204030204" pitchFamily="49" charset="0"/>
-              </a:rPr>
-              <a:t>c</a:t>
-            </a:r>
-            <a:r>
-              <a:rPr lang="fr-BE" sz="1800">
-                <a:solidFill>
-                  <a:srgbClr val="996633"/>
-                </a:solidFill>
-                <a:latin typeface="Consolas" panose="020B0609020204030204" pitchFamily="49" charset="0"/>
-              </a:rPr>
-              <a:t>.more }}   </a:t>
+              <a:t>  &lt;/main&gt;</a:t>
             </a:r>
           </a:p>
           <a:p>
             <a:pPr marL="0" indent="0">
+              <a:lnSpc>
+                <a:spcPct val="100000"/>
+              </a:lnSpc>
+              <a:spcBef>
+                <a:spcPts val="0"/>
+              </a:spcBef>
               <a:buNone/>
             </a:pPr>
             <a:r>
-              <a:rPr lang="fr-BE" sz="1800">
-                <a:solidFill>
-                  <a:srgbClr val="996633"/>
-                </a:solidFill>
-                <a:latin typeface="Consolas" panose="020B0609020204030204" pitchFamily="49" charset="0"/>
-              </a:rPr>
-              <a:t>    &lt;/em&gt;&lt;/p&gt;</a:t>
-            </a:r>
-          </a:p>
-          <a:p>
-            <a:pPr marL="0" indent="0">
-              <a:buNone/>
-            </a:pPr>
-            <a:r>
-              <a:rPr lang="fr-BE" sz="1800">
-                <a:solidFill>
-                  <a:srgbClr val="996633"/>
-                </a:solidFill>
-                <a:latin typeface="Consolas" panose="020B0609020204030204" pitchFamily="49" charset="0"/>
-              </a:rPr>
-              <a:t>  &lt;/section&gt;</a:t>
-            </a:r>
-          </a:p>
-          <a:p>
-            <a:pPr marL="0" indent="0">
-              <a:buNone/>
-            </a:pPr>
-            <a:r>
-              <a:rPr lang="fr-BE" sz="1800">
-                <a:solidFill>
-                  <a:srgbClr val="996633"/>
-                </a:solidFill>
-                <a:latin typeface="Consolas" panose="020B0609020204030204" pitchFamily="49" charset="0"/>
-              </a:rPr>
-              <a:t>  &lt;/main&gt;</a:t>
-            </a:r>
-          </a:p>
-          <a:p>
-            <a:pPr marL="0" indent="0">
-              <a:buNone/>
-            </a:pPr>
-            <a:r>
-              <a:rPr lang="fr-BE" sz="1800">
+              <a:rPr lang="fr-BE" sz="2000">
                 <a:solidFill>
                   <a:srgbClr val="996633"/>
                 </a:solidFill>
@@ -18551,8 +18621,8 @@
         </p:nvSpPr>
         <p:spPr>
           <a:xfrm>
-            <a:off x="838200" y="1690689"/>
-            <a:ext cx="5798906" cy="4486276"/>
+            <a:off x="369276" y="1690689"/>
+            <a:ext cx="6267829" cy="4486276"/>
           </a:xfrm>
         </p:spPr>
         <p:txBody>
@@ -18571,7 +18641,7 @@
               <a:buNone/>
             </a:pPr>
             <a:r>
-              <a:rPr lang="fr-BE" sz="1800">
+              <a:rPr lang="fr-BE" sz="2000">
                 <a:solidFill>
                   <a:srgbClr val="996633"/>
                 </a:solidFill>
@@ -18591,7 +18661,7 @@
               <a:buNone/>
             </a:pPr>
             <a:r>
-              <a:rPr lang="fr-BE" sz="1800">
+              <a:rPr lang="fr-BE" sz="2000">
                 <a:solidFill>
                   <a:srgbClr val="996633"/>
                 </a:solidFill>
@@ -18611,7 +18681,7 @@
               <a:buNone/>
             </a:pPr>
             <a:r>
-              <a:rPr lang="fr-BE" sz="1800">
+              <a:rPr lang="fr-BE" sz="2000">
                 <a:solidFill>
                   <a:srgbClr val="996633"/>
                 </a:solidFill>
@@ -18620,7 +18690,7 @@
               <a:t>    </a:t>
             </a:r>
             <a:r>
-              <a:rPr lang="fr-BE" sz="1800">
+              <a:rPr lang="fr-BE" sz="2000">
                 <a:solidFill>
                   <a:schemeClr val="accent2"/>
                 </a:solidFill>
@@ -18640,7 +18710,7 @@
               <a:buNone/>
             </a:pPr>
             <a:r>
-              <a:rPr lang="fr-BE" sz="1800">
+              <a:rPr lang="fr-BE" sz="2000">
                 <a:solidFill>
                   <a:schemeClr val="accent2"/>
                 </a:solidFill>
@@ -18660,7 +18730,7 @@
               <a:buNone/>
             </a:pPr>
             <a:r>
-              <a:rPr lang="fr-BE" sz="1800">
+              <a:rPr lang="fr-BE" sz="2000">
                 <a:solidFill>
                   <a:schemeClr val="accent2"/>
                 </a:solidFill>
@@ -18680,7 +18750,7 @@
               <a:buNone/>
             </a:pPr>
             <a:r>
-              <a:rPr lang="fr-BE" sz="1800">
+              <a:rPr lang="fr-BE" sz="2000">
                 <a:solidFill>
                   <a:schemeClr val="accent2"/>
                 </a:solidFill>
@@ -18700,7 +18770,7 @@
               <a:buNone/>
             </a:pPr>
             <a:r>
-              <a:rPr lang="fr-BE" sz="1800">
+              <a:rPr lang="fr-BE" sz="2000">
                 <a:solidFill>
                   <a:schemeClr val="accent2"/>
                 </a:solidFill>
@@ -18709,7 +18779,7 @@
               <a:t>               : 'card_mouseout' "</a:t>
             </a:r>
             <a:r>
-              <a:rPr lang="fr-BE" sz="1800">
+              <a:rPr lang="fr-BE" sz="2000">
                 <a:solidFill>
                   <a:srgbClr val="996633"/>
                 </a:solidFill>
@@ -18729,7 +18799,7 @@
               <a:buNone/>
             </a:pPr>
             <a:r>
-              <a:rPr lang="fr-BE" sz="1800">
+              <a:rPr lang="fr-BE" sz="2000">
                 <a:solidFill>
                   <a:srgbClr val="996633"/>
                 </a:solidFill>
@@ -18749,7 +18819,7 @@
               <a:buNone/>
             </a:pPr>
             <a:r>
-              <a:rPr lang="fr-BE" sz="1800">
+              <a:rPr lang="fr-BE" sz="2000">
                 <a:solidFill>
                   <a:srgbClr val="996633"/>
                 </a:solidFill>
@@ -18768,7 +18838,7 @@
               </a:spcBef>
               <a:buNone/>
             </a:pPr>
-            <a:endParaRPr lang="fr-BE" sz="1800">
+            <a:endParaRPr lang="fr-BE" sz="2000">
               <a:solidFill>
                 <a:srgbClr val="996633"/>
               </a:solidFill>
@@ -18786,7 +18856,7 @@
               <a:buNone/>
             </a:pPr>
             <a:r>
-              <a:rPr lang="fr-BE" sz="1800">
+              <a:rPr lang="fr-BE" sz="2000">
                 <a:solidFill>
                   <a:srgbClr val="996633"/>
                 </a:solidFill>
@@ -18795,7 +18865,7 @@
               <a:t>data() {</a:t>
             </a:r>
             <a:br>
-              <a:rPr lang="fr-BE" sz="1800">
+              <a:rPr lang="fr-BE" sz="2000">
                 <a:solidFill>
                   <a:srgbClr val="996633"/>
                 </a:solidFill>
@@ -18803,7 +18873,7 @@
               </a:rPr>
             </a:br>
             <a:r>
-              <a:rPr lang="fr-BE" sz="1800">
+              <a:rPr lang="fr-BE" sz="2000">
                 <a:solidFill>
                   <a:srgbClr val="996633"/>
                 </a:solidFill>
@@ -18812,7 +18882,7 @@
               <a:t>  return  {</a:t>
             </a:r>
             <a:br>
-              <a:rPr lang="fr-BE" sz="1800">
+              <a:rPr lang="fr-BE" sz="2000">
                 <a:solidFill>
                   <a:srgbClr val="996633"/>
                 </a:solidFill>
@@ -18820,7 +18890,7 @@
               </a:rPr>
             </a:br>
             <a:r>
-              <a:rPr lang="fr-BE" sz="1800">
+              <a:rPr lang="fr-BE" sz="2000">
                 <a:solidFill>
                   <a:srgbClr val="996633"/>
                 </a:solidFill>
@@ -18829,7 +18899,7 @@
               <a:t>    </a:t>
             </a:r>
             <a:r>
-              <a:rPr lang="fr-BE" sz="1800">
+              <a:rPr lang="fr-BE" sz="2000">
                 <a:solidFill>
                   <a:schemeClr val="accent2"/>
                 </a:solidFill>
@@ -18838,7 +18908,7 @@
               <a:t>HoveredId: -1, </a:t>
             </a:r>
             <a:br>
-              <a:rPr lang="fr-BE" sz="1800">
+              <a:rPr lang="fr-BE" sz="2000">
                 <a:solidFill>
                   <a:srgbClr val="996633"/>
                 </a:solidFill>
@@ -18846,7 +18916,7 @@
               </a:rPr>
             </a:br>
             <a:r>
-              <a:rPr lang="fr-BE" sz="1800">
+              <a:rPr lang="fr-BE" sz="2000">
                 <a:solidFill>
                   <a:srgbClr val="996633"/>
                 </a:solidFill>
@@ -18855,7 +18925,7 @@
               <a:t>  }</a:t>
             </a:r>
             <a:br>
-              <a:rPr lang="fr-BE" sz="1800">
+              <a:rPr lang="fr-BE" sz="2000">
                 <a:solidFill>
                   <a:srgbClr val="996633"/>
                 </a:solidFill>
@@ -18863,7 +18933,7 @@
               </a:rPr>
             </a:br>
             <a:r>
-              <a:rPr lang="fr-BE" sz="1800">
+              <a:rPr lang="fr-BE" sz="2000">
                 <a:solidFill>
                   <a:srgbClr val="996633"/>
                 </a:solidFill>
@@ -19108,8 +19178,8 @@
         </p:nvSpPr>
         <p:spPr>
           <a:xfrm>
-            <a:off x="838200" y="1690689"/>
-            <a:ext cx="5798906" cy="4486276"/>
+            <a:off x="597877" y="1690689"/>
+            <a:ext cx="6039229" cy="4486276"/>
           </a:xfrm>
         </p:spPr>
         <p:txBody>
@@ -19128,7 +19198,7 @@
               <a:buNone/>
             </a:pPr>
             <a:r>
-              <a:rPr lang="fr-BE" sz="1800">
+              <a:rPr lang="fr-BE" sz="2000">
                 <a:solidFill>
                   <a:srgbClr val="996633"/>
                 </a:solidFill>
@@ -19148,7 +19218,7 @@
               <a:buNone/>
             </a:pPr>
             <a:r>
-              <a:rPr lang="fr-BE" sz="1800">
+              <a:rPr lang="fr-BE" sz="2000">
                 <a:solidFill>
                   <a:srgbClr val="996633"/>
                 </a:solidFill>
@@ -19157,7 +19227,7 @@
               <a:t>  &lt;h3&gt;</a:t>
             </a:r>
             <a:r>
-              <a:rPr lang="fr-BE" sz="1800">
+              <a:rPr lang="fr-BE" sz="2000">
                 <a:solidFill>
                   <a:schemeClr val="accent2"/>
                 </a:solidFill>
@@ -19166,7 +19236,7 @@
               <a:t>{{ contents.length }}</a:t>
             </a:r>
             <a:r>
-              <a:rPr lang="fr-BE" sz="1800">
+              <a:rPr lang="fr-BE" sz="2000">
                 <a:solidFill>
                   <a:srgbClr val="996633"/>
                 </a:solidFill>
@@ -19186,7 +19256,7 @@
               <a:buNone/>
             </a:pPr>
             <a:r>
-              <a:rPr lang="fr-BE" sz="1800">
+              <a:rPr lang="fr-BE" sz="2000">
                 <a:solidFill>
                   <a:srgbClr val="996633"/>
                 </a:solidFill>
@@ -19195,7 +19265,7 @@
               <a:t>  &lt;p&gt; </a:t>
             </a:r>
             <a:r>
-              <a:rPr lang="fr-BE" sz="1800">
+              <a:rPr lang="fr-BE" sz="2000">
                 <a:solidFill>
                   <a:schemeClr val="accent5"/>
                 </a:solidFill>
@@ -19204,7 +19274,7 @@
               <a:t>{{ nombreArticles }} </a:t>
             </a:r>
             <a:r>
-              <a:rPr lang="fr-BE" sz="1800">
+              <a:rPr lang="fr-BE" sz="2000">
                 <a:solidFill>
                   <a:srgbClr val="996633"/>
                 </a:solidFill>
@@ -19224,7 +19294,7 @@
               <a:buNone/>
             </a:pPr>
             <a:r>
-              <a:rPr lang="fr-BE" sz="1800">
+              <a:rPr lang="fr-BE" sz="2000">
                 <a:solidFill>
                   <a:srgbClr val="996633"/>
                 </a:solidFill>
@@ -19233,7 +19303,7 @@
               <a:t>  &lt;button </a:t>
             </a:r>
             <a:r>
-              <a:rPr lang="fr-BE" sz="1800">
+              <a:rPr lang="fr-BE" sz="2000">
                 <a:solidFill>
                   <a:schemeClr val="accent1"/>
                 </a:solidFill>
@@ -19242,7 +19312,7 @@
               <a:t>@click="popup"</a:t>
             </a:r>
             <a:r>
-              <a:rPr lang="fr-BE" sz="1800">
+              <a:rPr lang="fr-BE" sz="2000">
                 <a:solidFill>
                   <a:srgbClr val="996633"/>
                 </a:solidFill>
@@ -19262,7 +19332,7 @@
               <a:buNone/>
             </a:pPr>
             <a:r>
-              <a:rPr lang="fr-BE" sz="1800">
+              <a:rPr lang="fr-BE" sz="2000">
                 <a:solidFill>
                   <a:srgbClr val="996633"/>
                 </a:solidFill>
@@ -19282,7 +19352,7 @@
               <a:buNone/>
             </a:pPr>
             <a:r>
-              <a:rPr lang="fr-BE" sz="1800">
+              <a:rPr lang="fr-BE" sz="2000">
                 <a:solidFill>
                   <a:schemeClr val="accent5"/>
                 </a:solidFill>
@@ -19291,7 +19361,7 @@
               <a:t>computed</a:t>
             </a:r>
             <a:r>
-              <a:rPr lang="fr-BE" sz="1800">
+              <a:rPr lang="fr-BE" sz="2000">
                 <a:solidFill>
                   <a:srgbClr val="996633"/>
                 </a:solidFill>
@@ -19311,7 +19381,7 @@
               <a:buNone/>
             </a:pPr>
             <a:r>
-              <a:rPr lang="fr-BE" sz="1800">
+              <a:rPr lang="fr-BE" sz="2000">
                 <a:solidFill>
                   <a:srgbClr val="996633"/>
                 </a:solidFill>
@@ -19320,7 +19390,7 @@
               <a:t>  </a:t>
             </a:r>
             <a:r>
-              <a:rPr lang="fr-BE" sz="1800">
+              <a:rPr lang="fr-BE" sz="2000">
                 <a:solidFill>
                   <a:schemeClr val="accent5"/>
                 </a:solidFill>
@@ -19340,7 +19410,7 @@
               <a:buNone/>
             </a:pPr>
             <a:r>
-              <a:rPr lang="fr-BE" sz="1800">
+              <a:rPr lang="fr-BE" sz="2000">
                 <a:solidFill>
                   <a:schemeClr val="accent5"/>
                 </a:solidFill>
@@ -19360,7 +19430,7 @@
               <a:buNone/>
             </a:pPr>
             <a:r>
-              <a:rPr lang="fr-BE" sz="1800">
+              <a:rPr lang="fr-BE" sz="2000">
                 <a:solidFill>
                   <a:schemeClr val="accent5"/>
                 </a:solidFill>
@@ -19380,7 +19450,7 @@
               <a:buNone/>
             </a:pPr>
             <a:r>
-              <a:rPr lang="fr-BE" sz="1800">
+              <a:rPr lang="fr-BE" sz="2000">
                 <a:solidFill>
                   <a:srgbClr val="996633"/>
                 </a:solidFill>
@@ -19400,7 +19470,7 @@
               <a:buNone/>
             </a:pPr>
             <a:r>
-              <a:rPr lang="fr-BE" sz="1800">
+              <a:rPr lang="fr-BE" sz="2000">
                 <a:solidFill>
                   <a:schemeClr val="accent1"/>
                 </a:solidFill>
@@ -19409,7 +19479,7 @@
               <a:t>methods</a:t>
             </a:r>
             <a:r>
-              <a:rPr lang="fr-BE" sz="1800">
+              <a:rPr lang="fr-BE" sz="2000">
                 <a:solidFill>
                   <a:srgbClr val="996633"/>
                 </a:solidFill>
@@ -19429,7 +19499,7 @@
               <a:buNone/>
             </a:pPr>
             <a:r>
-              <a:rPr lang="fr-BE" sz="1800">
+              <a:rPr lang="fr-BE" sz="2000">
                 <a:solidFill>
                   <a:srgbClr val="996633"/>
                 </a:solidFill>
@@ -19438,7 +19508,7 @@
               <a:t>  </a:t>
             </a:r>
             <a:r>
-              <a:rPr lang="fr-BE" sz="1800">
+              <a:rPr lang="fr-BE" sz="2000">
                 <a:solidFill>
                   <a:schemeClr val="accent1"/>
                 </a:solidFill>
@@ -19458,7 +19528,7 @@
               <a:buNone/>
             </a:pPr>
             <a:r>
-              <a:rPr lang="fr-BE" sz="1800">
+              <a:rPr lang="fr-BE" sz="2000">
                 <a:solidFill>
                   <a:schemeClr val="accent1"/>
                 </a:solidFill>
@@ -19478,27 +19548,16 @@
               <a:buNone/>
             </a:pPr>
             <a:r>
-              <a:rPr lang="fr-BE" sz="1800">
+              <a:rPr lang="fr-BE" sz="2000">
                 <a:solidFill>
                   <a:schemeClr val="accent1"/>
                 </a:solidFill>
                 <a:latin typeface="Consolas" panose="020B0609020204030204" pitchFamily="49" charset="0"/>
               </a:rPr>
-              <a:t>  }</a:t>
-            </a:r>
-          </a:p>
-          <a:p>
-            <a:pPr marL="0" indent="0">
-              <a:lnSpc>
-                <a:spcPct val="120000"/>
-              </a:lnSpc>
-              <a:spcBef>
-                <a:spcPts val="0"/>
-              </a:spcBef>
-              <a:buNone/>
-            </a:pPr>
-            <a:r>
-              <a:rPr lang="fr-BE" sz="1800">
+              <a:t>  } </a:t>
+            </a:r>
+            <a:r>
+              <a:rPr lang="fr-BE" sz="2000">
                 <a:solidFill>
                   <a:srgbClr val="996633"/>
                 </a:solidFill>
@@ -19739,9 +19798,16 @@
             <p:ph idx="1"/>
           </p:nvPr>
         </p:nvSpPr>
-        <p:spPr/>
-        <p:txBody>
-          <a:bodyPr/>
+        <p:spPr>
+          <a:xfrm>
+            <a:off x="838200" y="1690689"/>
+            <a:ext cx="10750062" cy="4486276"/>
+          </a:xfrm>
+        </p:spPr>
+        <p:txBody>
+          <a:bodyPr>
+            <a:normAutofit/>
+          </a:bodyPr>
           <a:lstStyle/>
           <a:p>
             <a:r>
@@ -19752,8 +19818,18 @@
           <a:p>
             <a:r>
               <a:rPr lang="fr-BE"/>
-              <a:t>Implantez les fonctionnalités suivantes dans le footer : </a:t>
-            </a:r>
+              <a:t>Implantez les fonctionnalités suivantes dans </a:t>
+            </a:r>
+            <a:r>
+              <a:rPr lang="fr-BE">
+                <a:solidFill>
+                  <a:srgbClr val="996633"/>
+                </a:solidFill>
+                <a:latin typeface="Consolas" panose="020B0609020204030204" pitchFamily="49" charset="0"/>
+              </a:rPr>
+              <a:t>Footer.js</a:t>
+            </a:r>
+            <a:endParaRPr lang="fr-BE"/>
           </a:p>
           <a:p>
             <a:pPr lvl="1"/>
@@ -19806,8 +19882,23 @@
             </a:r>
           </a:p>
           <a:p>
-            <a:pPr lvl="1"/>
-            <a:endParaRPr lang="fr-BE"/>
+            <a:r>
+              <a:rPr lang="fr-BE"/>
+              <a:t>Seul </a:t>
+            </a:r>
+            <a:r>
+              <a:rPr lang="fr-BE">
+                <a:solidFill>
+                  <a:srgbClr val="996633"/>
+                </a:solidFill>
+                <a:latin typeface="Consolas" panose="020B0609020204030204" pitchFamily="49" charset="0"/>
+              </a:rPr>
+              <a:t>Footer.js</a:t>
+            </a:r>
+            <a:r>
+              <a:rPr lang="fr-BE"/>
+              <a:t> est modifié</a:t>
+            </a:r>
           </a:p>
         </p:txBody>
       </p:sp>

</xml_diff>